<commit_message>
Primeira versão completa do capítulo 3.
</commit_message>
<xml_diff>
--- a/livro/figuras-estrutura-dados.pptx
+++ b/livro/figuras-estrutura-dados.pptx
@@ -7,6 +7,8 @@
   <p:sldIdLst>
     <p:sldId id="256" r:id="rId2"/>
     <p:sldId id="257" r:id="rId3"/>
+    <p:sldId id="258" r:id="rId4"/>
+    <p:sldId id="259" r:id="rId5"/>
   </p:sldIdLst>
   <p:sldSz cx="9144000" cy="6858000" type="screen4x3"/>
   <p:notesSz cx="6858000" cy="9144000"/>
@@ -289,7 +291,7 @@
           <a:p>
             <a:fld id="{55A800BC-7198-8F46-BF2F-34554785D7CB}" type="datetimeFigureOut">
               <a:rPr lang="en-US" smtClean="0"/>
-              <a:t>08/11/13</a:t>
+              <a:t>11/11/13</a:t>
             </a:fld>
             <a:endParaRPr lang="pt-BR"/>
           </a:p>
@@ -459,7 +461,7 @@
           <a:p>
             <a:fld id="{55A800BC-7198-8F46-BF2F-34554785D7CB}" type="datetimeFigureOut">
               <a:rPr lang="en-US" smtClean="0"/>
-              <a:t>08/11/13</a:t>
+              <a:t>11/11/13</a:t>
             </a:fld>
             <a:endParaRPr lang="pt-BR"/>
           </a:p>
@@ -639,7 +641,7 @@
           <a:p>
             <a:fld id="{55A800BC-7198-8F46-BF2F-34554785D7CB}" type="datetimeFigureOut">
               <a:rPr lang="en-US" smtClean="0"/>
-              <a:t>08/11/13</a:t>
+              <a:t>11/11/13</a:t>
             </a:fld>
             <a:endParaRPr lang="pt-BR"/>
           </a:p>
@@ -809,7 +811,7 @@
           <a:p>
             <a:fld id="{55A800BC-7198-8F46-BF2F-34554785D7CB}" type="datetimeFigureOut">
               <a:rPr lang="en-US" smtClean="0"/>
-              <a:t>08/11/13</a:t>
+              <a:t>11/11/13</a:t>
             </a:fld>
             <a:endParaRPr lang="pt-BR"/>
           </a:p>
@@ -1055,7 +1057,7 @@
           <a:p>
             <a:fld id="{55A800BC-7198-8F46-BF2F-34554785D7CB}" type="datetimeFigureOut">
               <a:rPr lang="en-US" smtClean="0"/>
-              <a:t>08/11/13</a:t>
+              <a:t>11/11/13</a:t>
             </a:fld>
             <a:endParaRPr lang="pt-BR"/>
           </a:p>
@@ -1343,7 +1345,7 @@
           <a:p>
             <a:fld id="{55A800BC-7198-8F46-BF2F-34554785D7CB}" type="datetimeFigureOut">
               <a:rPr lang="en-US" smtClean="0"/>
-              <a:t>08/11/13</a:t>
+              <a:t>11/11/13</a:t>
             </a:fld>
             <a:endParaRPr lang="pt-BR"/>
           </a:p>
@@ -1765,7 +1767,7 @@
           <a:p>
             <a:fld id="{55A800BC-7198-8F46-BF2F-34554785D7CB}" type="datetimeFigureOut">
               <a:rPr lang="en-US" smtClean="0"/>
-              <a:t>08/11/13</a:t>
+              <a:t>11/11/13</a:t>
             </a:fld>
             <a:endParaRPr lang="pt-BR"/>
           </a:p>
@@ -1883,7 +1885,7 @@
           <a:p>
             <a:fld id="{55A800BC-7198-8F46-BF2F-34554785D7CB}" type="datetimeFigureOut">
               <a:rPr lang="en-US" smtClean="0"/>
-              <a:t>08/11/13</a:t>
+              <a:t>11/11/13</a:t>
             </a:fld>
             <a:endParaRPr lang="pt-BR"/>
           </a:p>
@@ -1978,7 +1980,7 @@
           <a:p>
             <a:fld id="{55A800BC-7198-8F46-BF2F-34554785D7CB}" type="datetimeFigureOut">
               <a:rPr lang="en-US" smtClean="0"/>
-              <a:t>08/11/13</a:t>
+              <a:t>11/11/13</a:t>
             </a:fld>
             <a:endParaRPr lang="pt-BR"/>
           </a:p>
@@ -2255,7 +2257,7 @@
           <a:p>
             <a:fld id="{55A800BC-7198-8F46-BF2F-34554785D7CB}" type="datetimeFigureOut">
               <a:rPr lang="en-US" smtClean="0"/>
-              <a:t>08/11/13</a:t>
+              <a:t>11/11/13</a:t>
             </a:fld>
             <a:endParaRPr lang="pt-BR"/>
           </a:p>
@@ -2508,7 +2510,7 @@
           <a:p>
             <a:fld id="{55A800BC-7198-8F46-BF2F-34554785D7CB}" type="datetimeFigureOut">
               <a:rPr lang="en-US" smtClean="0"/>
-              <a:t>08/11/13</a:t>
+              <a:t>11/11/13</a:t>
             </a:fld>
             <a:endParaRPr lang="pt-BR"/>
           </a:p>
@@ -2721,7 +2723,7 @@
           <a:p>
             <a:fld id="{55A800BC-7198-8F46-BF2F-34554785D7CB}" type="datetimeFigureOut">
               <a:rPr lang="en-US" smtClean="0"/>
-              <a:t>08/11/13</a:t>
+              <a:t>11/11/13</a:t>
             </a:fld>
             <a:endParaRPr lang="pt-BR"/>
           </a:p>
@@ -3944,11 +3946,7 @@
           <a:p>
             <a:r>
               <a:rPr lang="pt-BR" sz="1400" dirty="0" smtClean="0"/>
-              <a:t>pr</a:t>
-            </a:r>
-            <a:r>
-              <a:rPr lang="pt-BR" sz="1400" dirty="0" smtClean="0"/>
-              <a:t>óximo</a:t>
+              <a:t>próximo</a:t>
             </a:r>
             <a:endParaRPr lang="pt-BR" sz="1400" dirty="0"/>
           </a:p>
@@ -4067,6 +4065,1868 @@
     <p:extLst>
       <p:ext uri="{BB962C8B-B14F-4D97-AF65-F5344CB8AC3E}">
         <p14:creationId xmlns:p14="http://schemas.microsoft.com/office/powerpoint/2010/main" val="266930115"/>
+      </p:ext>
+    </p:extLst>
+  </p:cSld>
+  <p:clrMapOvr>
+    <a:masterClrMapping/>
+  </p:clrMapOvr>
+</p:sld>
+</file>
+
+<file path=ppt/slides/slide3.xml><?xml version="1.0" encoding="utf-8"?>
+<p:sld xmlns:a="http://schemas.openxmlformats.org/drawingml/2006/main" xmlns:r="http://schemas.openxmlformats.org/officeDocument/2006/relationships" xmlns:p="http://schemas.openxmlformats.org/presentationml/2006/main">
+  <p:cSld>
+    <p:spTree>
+      <p:nvGrpSpPr>
+        <p:cNvPr id="1" name=""/>
+        <p:cNvGrpSpPr/>
+        <p:nvPr/>
+      </p:nvGrpSpPr>
+      <p:grpSpPr>
+        <a:xfrm>
+          <a:off x="0" y="0"/>
+          <a:ext cx="0" cy="0"/>
+          <a:chOff x="0" y="0"/>
+          <a:chExt cx="0" cy="0"/>
+        </a:xfrm>
+      </p:grpSpPr>
+      <p:sp>
+        <p:nvSpPr>
+          <p:cNvPr id="4" name="Rectangle 3"/>
+          <p:cNvSpPr/>
+          <p:nvPr/>
+        </p:nvSpPr>
+        <p:spPr>
+          <a:xfrm>
+            <a:off x="829404" y="1631897"/>
+            <a:ext cx="720000" cy="321733"/>
+          </a:xfrm>
+          <a:prstGeom prst="rect">
+            <a:avLst/>
+          </a:prstGeom>
+          <a:ln>
+            <a:solidFill>
+              <a:schemeClr val="tx1"/>
+            </a:solidFill>
+          </a:ln>
+          <a:effectLst/>
+        </p:spPr>
+        <p:style>
+          <a:lnRef idx="2">
+            <a:schemeClr val="accent1"/>
+          </a:lnRef>
+          <a:fillRef idx="1">
+            <a:schemeClr val="lt1"/>
+          </a:fillRef>
+          <a:effectRef idx="0">
+            <a:schemeClr val="accent1"/>
+          </a:effectRef>
+          <a:fontRef idx="minor">
+            <a:schemeClr val="dk1"/>
+          </a:fontRef>
+        </p:style>
+        <p:txBody>
+          <a:bodyPr rtlCol="0" anchor="ctr"/>
+          <a:lstStyle/>
+          <a:p>
+            <a:pPr algn="ctr"/>
+            <a:r>
+              <a:rPr lang="pt-BR" sz="1400" dirty="0" smtClean="0"/>
+              <a:t>1</a:t>
+            </a:r>
+            <a:endParaRPr lang="pt-BR" sz="1400" dirty="0"/>
+          </a:p>
+        </p:txBody>
+      </p:sp>
+      <p:sp>
+        <p:nvSpPr>
+          <p:cNvPr id="5" name="Rectangle 4"/>
+          <p:cNvSpPr/>
+          <p:nvPr/>
+        </p:nvSpPr>
+        <p:spPr>
+          <a:xfrm>
+            <a:off x="1549741" y="1631897"/>
+            <a:ext cx="720000" cy="321733"/>
+          </a:xfrm>
+          <a:prstGeom prst="rect">
+            <a:avLst/>
+          </a:prstGeom>
+          <a:ln>
+            <a:solidFill>
+              <a:schemeClr val="tx1"/>
+            </a:solidFill>
+          </a:ln>
+          <a:effectLst/>
+        </p:spPr>
+        <p:style>
+          <a:lnRef idx="2">
+            <a:schemeClr val="accent1"/>
+          </a:lnRef>
+          <a:fillRef idx="1">
+            <a:schemeClr val="lt1"/>
+          </a:fillRef>
+          <a:effectRef idx="0">
+            <a:schemeClr val="accent1"/>
+          </a:effectRef>
+          <a:fontRef idx="minor">
+            <a:schemeClr val="dk1"/>
+          </a:fontRef>
+        </p:style>
+        <p:txBody>
+          <a:bodyPr rtlCol="0" anchor="ctr"/>
+          <a:lstStyle/>
+          <a:p>
+            <a:pPr algn="ctr"/>
+            <a:r>
+              <a:rPr lang="pt-BR" sz="1400" dirty="0" smtClean="0"/>
+              <a:t>2</a:t>
+            </a:r>
+            <a:endParaRPr lang="pt-BR" sz="1400" dirty="0"/>
+          </a:p>
+        </p:txBody>
+      </p:sp>
+      <p:sp>
+        <p:nvSpPr>
+          <p:cNvPr id="6" name="Rectangle 5"/>
+          <p:cNvSpPr/>
+          <p:nvPr/>
+        </p:nvSpPr>
+        <p:spPr>
+          <a:xfrm>
+            <a:off x="2269741" y="1631897"/>
+            <a:ext cx="720000" cy="321733"/>
+          </a:xfrm>
+          <a:prstGeom prst="rect">
+            <a:avLst/>
+          </a:prstGeom>
+          <a:ln>
+            <a:solidFill>
+              <a:schemeClr val="tx1"/>
+            </a:solidFill>
+          </a:ln>
+          <a:effectLst/>
+        </p:spPr>
+        <p:style>
+          <a:lnRef idx="2">
+            <a:schemeClr val="accent1"/>
+          </a:lnRef>
+          <a:fillRef idx="1">
+            <a:schemeClr val="lt1"/>
+          </a:fillRef>
+          <a:effectRef idx="0">
+            <a:schemeClr val="accent1"/>
+          </a:effectRef>
+          <a:fontRef idx="minor">
+            <a:schemeClr val="dk1"/>
+          </a:fontRef>
+        </p:style>
+        <p:txBody>
+          <a:bodyPr rtlCol="0" anchor="ctr"/>
+          <a:lstStyle/>
+          <a:p>
+            <a:pPr algn="ctr"/>
+            <a:r>
+              <a:rPr lang="pt-BR" sz="1400" dirty="0" smtClean="0"/>
+              <a:t>3</a:t>
+            </a:r>
+            <a:endParaRPr lang="pt-BR" sz="1400" dirty="0"/>
+          </a:p>
+        </p:txBody>
+      </p:sp>
+      <p:sp>
+        <p:nvSpPr>
+          <p:cNvPr id="7" name="Rectangle 6"/>
+          <p:cNvSpPr/>
+          <p:nvPr/>
+        </p:nvSpPr>
+        <p:spPr>
+          <a:xfrm>
+            <a:off x="2990078" y="1631897"/>
+            <a:ext cx="720000" cy="321733"/>
+          </a:xfrm>
+          <a:prstGeom prst="rect">
+            <a:avLst/>
+          </a:prstGeom>
+          <a:ln>
+            <a:solidFill>
+              <a:schemeClr val="tx1"/>
+            </a:solidFill>
+          </a:ln>
+          <a:effectLst/>
+        </p:spPr>
+        <p:style>
+          <a:lnRef idx="2">
+            <a:schemeClr val="accent1"/>
+          </a:lnRef>
+          <a:fillRef idx="1">
+            <a:schemeClr val="lt1"/>
+          </a:fillRef>
+          <a:effectRef idx="0">
+            <a:schemeClr val="accent1"/>
+          </a:effectRef>
+          <a:fontRef idx="minor">
+            <a:schemeClr val="dk1"/>
+          </a:fontRef>
+        </p:style>
+        <p:txBody>
+          <a:bodyPr rtlCol="0" anchor="ctr"/>
+          <a:lstStyle/>
+          <a:p>
+            <a:pPr algn="ctr"/>
+            <a:r>
+              <a:rPr lang="pt-BR" sz="1400" dirty="0" smtClean="0"/>
+              <a:t>...</a:t>
+            </a:r>
+            <a:endParaRPr lang="pt-BR" sz="1400" dirty="0"/>
+          </a:p>
+        </p:txBody>
+      </p:sp>
+      <p:sp>
+        <p:nvSpPr>
+          <p:cNvPr id="8" name="Rectangle 7"/>
+          <p:cNvSpPr/>
+          <p:nvPr/>
+        </p:nvSpPr>
+        <p:spPr>
+          <a:xfrm>
+            <a:off x="3710078" y="1631897"/>
+            <a:ext cx="720000" cy="321733"/>
+          </a:xfrm>
+          <a:prstGeom prst="rect">
+            <a:avLst/>
+          </a:prstGeom>
+          <a:ln>
+            <a:solidFill>
+              <a:schemeClr val="tx1"/>
+            </a:solidFill>
+          </a:ln>
+          <a:effectLst/>
+        </p:spPr>
+        <p:style>
+          <a:lnRef idx="2">
+            <a:schemeClr val="accent1"/>
+          </a:lnRef>
+          <a:fillRef idx="1">
+            <a:schemeClr val="lt1"/>
+          </a:fillRef>
+          <a:effectRef idx="0">
+            <a:schemeClr val="accent1"/>
+          </a:effectRef>
+          <a:fontRef idx="minor">
+            <a:schemeClr val="dk1"/>
+          </a:fontRef>
+        </p:style>
+        <p:txBody>
+          <a:bodyPr rtlCol="0" anchor="ctr"/>
+          <a:lstStyle/>
+          <a:p>
+            <a:pPr algn="ctr"/>
+            <a:r>
+              <a:rPr lang="pt-BR" sz="1400" dirty="0" smtClean="0"/>
+              <a:t>...</a:t>
+            </a:r>
+            <a:endParaRPr lang="pt-BR" sz="1400" dirty="0"/>
+          </a:p>
+        </p:txBody>
+      </p:sp>
+      <p:sp>
+        <p:nvSpPr>
+          <p:cNvPr id="9" name="Rectangle 8"/>
+          <p:cNvSpPr/>
+          <p:nvPr/>
+        </p:nvSpPr>
+        <p:spPr>
+          <a:xfrm>
+            <a:off x="4430415" y="1631897"/>
+            <a:ext cx="720000" cy="321733"/>
+          </a:xfrm>
+          <a:prstGeom prst="rect">
+            <a:avLst/>
+          </a:prstGeom>
+          <a:ln>
+            <a:solidFill>
+              <a:schemeClr val="tx1"/>
+            </a:solidFill>
+          </a:ln>
+          <a:effectLst/>
+        </p:spPr>
+        <p:style>
+          <a:lnRef idx="2">
+            <a:schemeClr val="accent1"/>
+          </a:lnRef>
+          <a:fillRef idx="1">
+            <a:schemeClr val="lt1"/>
+          </a:fillRef>
+          <a:effectRef idx="0">
+            <a:schemeClr val="accent1"/>
+          </a:effectRef>
+          <a:fontRef idx="minor">
+            <a:schemeClr val="dk1"/>
+          </a:fontRef>
+        </p:style>
+        <p:txBody>
+          <a:bodyPr rtlCol="0" anchor="ctr"/>
+          <a:lstStyle/>
+          <a:p>
+            <a:pPr algn="ctr"/>
+            <a:r>
+              <a:rPr lang="pt-BR" sz="1400" dirty="0" smtClean="0"/>
+              <a:t>10</a:t>
+            </a:r>
+            <a:endParaRPr lang="pt-BR" sz="1400" dirty="0"/>
+          </a:p>
+        </p:txBody>
+      </p:sp>
+      <p:sp>
+        <p:nvSpPr>
+          <p:cNvPr id="10" name="Rectangle 9"/>
+          <p:cNvSpPr/>
+          <p:nvPr/>
+        </p:nvSpPr>
+        <p:spPr>
+          <a:xfrm>
+            <a:off x="5151421" y="1631897"/>
+            <a:ext cx="720000" cy="321733"/>
+          </a:xfrm>
+          <a:prstGeom prst="rect">
+            <a:avLst/>
+          </a:prstGeom>
+          <a:ln>
+            <a:solidFill>
+              <a:schemeClr val="tx1"/>
+            </a:solidFill>
+          </a:ln>
+          <a:effectLst/>
+        </p:spPr>
+        <p:style>
+          <a:lnRef idx="2">
+            <a:schemeClr val="accent1"/>
+          </a:lnRef>
+          <a:fillRef idx="1">
+            <a:schemeClr val="lt1"/>
+          </a:fillRef>
+          <a:effectRef idx="0">
+            <a:schemeClr val="accent1"/>
+          </a:effectRef>
+          <a:fontRef idx="minor">
+            <a:schemeClr val="dk1"/>
+          </a:fontRef>
+        </p:style>
+        <p:txBody>
+          <a:bodyPr rtlCol="0" anchor="ctr"/>
+          <a:lstStyle/>
+          <a:p>
+            <a:pPr algn="ctr"/>
+            <a:r>
+              <a:rPr lang="pt-BR" sz="1400" dirty="0" smtClean="0"/>
+              <a:t>11</a:t>
+            </a:r>
+            <a:endParaRPr lang="pt-BR" sz="1400" dirty="0"/>
+          </a:p>
+        </p:txBody>
+      </p:sp>
+      <p:sp>
+        <p:nvSpPr>
+          <p:cNvPr id="11" name="Rectangle 10"/>
+          <p:cNvSpPr/>
+          <p:nvPr/>
+        </p:nvSpPr>
+        <p:spPr>
+          <a:xfrm>
+            <a:off x="5871758" y="1631897"/>
+            <a:ext cx="720000" cy="321733"/>
+          </a:xfrm>
+          <a:prstGeom prst="rect">
+            <a:avLst/>
+          </a:prstGeom>
+          <a:ln>
+            <a:solidFill>
+              <a:schemeClr val="tx1"/>
+            </a:solidFill>
+          </a:ln>
+          <a:effectLst/>
+        </p:spPr>
+        <p:style>
+          <a:lnRef idx="2">
+            <a:schemeClr val="accent1"/>
+          </a:lnRef>
+          <a:fillRef idx="1">
+            <a:schemeClr val="lt1"/>
+          </a:fillRef>
+          <a:effectRef idx="0">
+            <a:schemeClr val="accent1"/>
+          </a:effectRef>
+          <a:fontRef idx="minor">
+            <a:schemeClr val="dk1"/>
+          </a:fontRef>
+        </p:style>
+        <p:txBody>
+          <a:bodyPr rtlCol="0" anchor="ctr"/>
+          <a:lstStyle/>
+          <a:p>
+            <a:pPr algn="ctr"/>
+            <a:r>
+              <a:rPr lang="pt-BR" sz="1400" dirty="0" smtClean="0"/>
+              <a:t>12</a:t>
+            </a:r>
+            <a:endParaRPr lang="pt-BR" sz="1400" dirty="0"/>
+          </a:p>
+        </p:txBody>
+      </p:sp>
+    </p:spTree>
+    <p:extLst>
+      <p:ext uri="{BB962C8B-B14F-4D97-AF65-F5344CB8AC3E}">
+        <p14:creationId xmlns:p14="http://schemas.microsoft.com/office/powerpoint/2010/main" val="3057924272"/>
+      </p:ext>
+    </p:extLst>
+  </p:cSld>
+  <p:clrMapOvr>
+    <a:masterClrMapping/>
+  </p:clrMapOvr>
+</p:sld>
+</file>
+
+<file path=ppt/slides/slide4.xml><?xml version="1.0" encoding="utf-8"?>
+<p:sld xmlns:a="http://schemas.openxmlformats.org/drawingml/2006/main" xmlns:r="http://schemas.openxmlformats.org/officeDocument/2006/relationships" xmlns:p="http://schemas.openxmlformats.org/presentationml/2006/main">
+  <p:cSld>
+    <p:spTree>
+      <p:nvGrpSpPr>
+        <p:cNvPr id="1" name=""/>
+        <p:cNvGrpSpPr/>
+        <p:nvPr/>
+      </p:nvGrpSpPr>
+      <p:grpSpPr>
+        <a:xfrm>
+          <a:off x="0" y="0"/>
+          <a:ext cx="0" cy="0"/>
+          <a:chOff x="0" y="0"/>
+          <a:chExt cx="0" cy="0"/>
+        </a:xfrm>
+      </p:grpSpPr>
+      <p:sp>
+        <p:nvSpPr>
+          <p:cNvPr id="5" name="Rectangle 4"/>
+          <p:cNvSpPr/>
+          <p:nvPr/>
+        </p:nvSpPr>
+        <p:spPr>
+          <a:xfrm>
+            <a:off x="4411132" y="1456267"/>
+            <a:ext cx="1253067" cy="1337733"/>
+          </a:xfrm>
+          <a:prstGeom prst="rect">
+            <a:avLst/>
+          </a:prstGeom>
+        </p:spPr>
+        <p:style>
+          <a:lnRef idx="2">
+            <a:schemeClr val="dk1"/>
+          </a:lnRef>
+          <a:fillRef idx="1">
+            <a:schemeClr val="lt1"/>
+          </a:fillRef>
+          <a:effectRef idx="0">
+            <a:schemeClr val="dk1"/>
+          </a:effectRef>
+          <a:fontRef idx="minor">
+            <a:schemeClr val="dk1"/>
+          </a:fontRef>
+        </p:style>
+        <p:txBody>
+          <a:bodyPr rtlCol="0" anchor="ctr"/>
+          <a:lstStyle/>
+          <a:p>
+            <a:pPr algn="ctr"/>
+            <a:endParaRPr lang="pt-PT"/>
+          </a:p>
+        </p:txBody>
+      </p:sp>
+      <p:sp>
+        <p:nvSpPr>
+          <p:cNvPr id="6" name="Rectangle 5"/>
+          <p:cNvSpPr/>
+          <p:nvPr/>
+        </p:nvSpPr>
+        <p:spPr>
+          <a:xfrm>
+            <a:off x="4529671" y="1557869"/>
+            <a:ext cx="465666" cy="414866"/>
+          </a:xfrm>
+          <a:prstGeom prst="rect">
+            <a:avLst/>
+          </a:prstGeom>
+        </p:spPr>
+        <p:style>
+          <a:lnRef idx="2">
+            <a:schemeClr val="dk1"/>
+          </a:lnRef>
+          <a:fillRef idx="1">
+            <a:schemeClr val="lt1"/>
+          </a:fillRef>
+          <a:effectRef idx="0">
+            <a:schemeClr val="dk1"/>
+          </a:effectRef>
+          <a:fontRef idx="minor">
+            <a:schemeClr val="dk1"/>
+          </a:fontRef>
+        </p:style>
+        <p:txBody>
+          <a:bodyPr rtlCol="0" anchor="ctr"/>
+          <a:lstStyle/>
+          <a:p>
+            <a:pPr algn="ctr"/>
+            <a:r>
+              <a:rPr lang="pt-PT" smtClean="0"/>
+              <a:t>A</a:t>
+            </a:r>
+            <a:endParaRPr lang="pt-PT"/>
+          </a:p>
+        </p:txBody>
+      </p:sp>
+      <p:sp>
+        <p:nvSpPr>
+          <p:cNvPr id="7" name="Rectangle 6"/>
+          <p:cNvSpPr/>
+          <p:nvPr/>
+        </p:nvSpPr>
+        <p:spPr>
+          <a:xfrm>
+            <a:off x="5080002" y="1557869"/>
+            <a:ext cx="465666" cy="414866"/>
+          </a:xfrm>
+          <a:prstGeom prst="rect">
+            <a:avLst/>
+          </a:prstGeom>
+        </p:spPr>
+        <p:style>
+          <a:lnRef idx="2">
+            <a:schemeClr val="dk1"/>
+          </a:lnRef>
+          <a:fillRef idx="1">
+            <a:schemeClr val="lt1"/>
+          </a:fillRef>
+          <a:effectRef idx="0">
+            <a:schemeClr val="dk1"/>
+          </a:effectRef>
+          <a:fontRef idx="minor">
+            <a:schemeClr val="dk1"/>
+          </a:fontRef>
+        </p:style>
+        <p:txBody>
+          <a:bodyPr rtlCol="0" anchor="ctr"/>
+          <a:lstStyle/>
+          <a:p>
+            <a:pPr algn="ctr"/>
+            <a:r>
+              <a:rPr lang="pt-PT" smtClean="0"/>
+              <a:t>B</a:t>
+            </a:r>
+            <a:endParaRPr lang="pt-PT"/>
+          </a:p>
+        </p:txBody>
+      </p:sp>
+      <p:sp>
+        <p:nvSpPr>
+          <p:cNvPr id="8" name="Rectangle 7"/>
+          <p:cNvSpPr/>
+          <p:nvPr/>
+        </p:nvSpPr>
+        <p:spPr>
+          <a:xfrm>
+            <a:off x="4529671" y="2057399"/>
+            <a:ext cx="465666" cy="414866"/>
+          </a:xfrm>
+          <a:prstGeom prst="rect">
+            <a:avLst/>
+          </a:prstGeom>
+        </p:spPr>
+        <p:style>
+          <a:lnRef idx="2">
+            <a:schemeClr val="dk1"/>
+          </a:lnRef>
+          <a:fillRef idx="1">
+            <a:schemeClr val="lt1"/>
+          </a:fillRef>
+          <a:effectRef idx="0">
+            <a:schemeClr val="dk1"/>
+          </a:effectRef>
+          <a:fontRef idx="minor">
+            <a:schemeClr val="dk1"/>
+          </a:fontRef>
+        </p:style>
+        <p:txBody>
+          <a:bodyPr rtlCol="0" anchor="ctr"/>
+          <a:lstStyle/>
+          <a:p>
+            <a:pPr algn="ctr"/>
+            <a:r>
+              <a:rPr lang="pt-PT" smtClean="0"/>
+              <a:t>C</a:t>
+            </a:r>
+            <a:endParaRPr lang="pt-PT"/>
+          </a:p>
+        </p:txBody>
+      </p:sp>
+      <p:sp>
+        <p:nvSpPr>
+          <p:cNvPr id="9" name="Rectangle 8"/>
+          <p:cNvSpPr/>
+          <p:nvPr/>
+        </p:nvSpPr>
+        <p:spPr>
+          <a:xfrm>
+            <a:off x="5080003" y="2057399"/>
+            <a:ext cx="465666" cy="414866"/>
+          </a:xfrm>
+          <a:prstGeom prst="rect">
+            <a:avLst/>
+          </a:prstGeom>
+        </p:spPr>
+        <p:style>
+          <a:lnRef idx="2">
+            <a:schemeClr val="dk1"/>
+          </a:lnRef>
+          <a:fillRef idx="1">
+            <a:schemeClr val="lt1"/>
+          </a:fillRef>
+          <a:effectRef idx="0">
+            <a:schemeClr val="dk1"/>
+          </a:effectRef>
+          <a:fontRef idx="minor">
+            <a:schemeClr val="dk1"/>
+          </a:fontRef>
+        </p:style>
+        <p:txBody>
+          <a:bodyPr rtlCol="0" anchor="ctr"/>
+          <a:lstStyle/>
+          <a:p>
+            <a:pPr algn="ctr"/>
+            <a:r>
+              <a:rPr lang="pt-PT" smtClean="0"/>
+              <a:t>D</a:t>
+            </a:r>
+            <a:endParaRPr lang="pt-PT"/>
+          </a:p>
+        </p:txBody>
+      </p:sp>
+      <p:sp>
+        <p:nvSpPr>
+          <p:cNvPr id="10" name="TextBox 9"/>
+          <p:cNvSpPr txBox="1"/>
+          <p:nvPr/>
+        </p:nvSpPr>
+        <p:spPr>
+          <a:xfrm>
+            <a:off x="4903771" y="2441599"/>
+            <a:ext cx="301660" cy="369332"/>
+          </a:xfrm>
+          <a:prstGeom prst="rect">
+            <a:avLst/>
+          </a:prstGeom>
+          <a:noFill/>
+        </p:spPr>
+        <p:txBody>
+          <a:bodyPr wrap="none" rtlCol="0">
+            <a:spAutoFit/>
+          </a:bodyPr>
+          <a:lstStyle/>
+          <a:p>
+            <a:r>
+              <a:rPr lang="pt-PT" smtClean="0"/>
+              <a:t>6</a:t>
+            </a:r>
+            <a:endParaRPr lang="pt-PT"/>
+          </a:p>
+        </p:txBody>
+      </p:sp>
+      <p:sp>
+        <p:nvSpPr>
+          <p:cNvPr id="17" name="Rectangle 16"/>
+          <p:cNvSpPr/>
+          <p:nvPr/>
+        </p:nvSpPr>
+        <p:spPr>
+          <a:xfrm>
+            <a:off x="3650704" y="1230869"/>
+            <a:ext cx="1253067" cy="1337733"/>
+          </a:xfrm>
+          <a:prstGeom prst="rect">
+            <a:avLst/>
+          </a:prstGeom>
+        </p:spPr>
+        <p:style>
+          <a:lnRef idx="2">
+            <a:schemeClr val="dk1"/>
+          </a:lnRef>
+          <a:fillRef idx="1">
+            <a:schemeClr val="lt1"/>
+          </a:fillRef>
+          <a:effectRef idx="0">
+            <a:schemeClr val="dk1"/>
+          </a:effectRef>
+          <a:fontRef idx="minor">
+            <a:schemeClr val="dk1"/>
+          </a:fontRef>
+        </p:style>
+        <p:txBody>
+          <a:bodyPr rtlCol="0" anchor="ctr"/>
+          <a:lstStyle/>
+          <a:p>
+            <a:pPr algn="ctr"/>
+            <a:endParaRPr lang="pt-PT"/>
+          </a:p>
+        </p:txBody>
+      </p:sp>
+      <p:sp>
+        <p:nvSpPr>
+          <p:cNvPr id="18" name="Rectangle 17"/>
+          <p:cNvSpPr/>
+          <p:nvPr/>
+        </p:nvSpPr>
+        <p:spPr>
+          <a:xfrm>
+            <a:off x="4126970" y="1512393"/>
+            <a:ext cx="465666" cy="414866"/>
+          </a:xfrm>
+          <a:prstGeom prst="rect">
+            <a:avLst/>
+          </a:prstGeom>
+        </p:spPr>
+        <p:style>
+          <a:lnRef idx="2">
+            <a:schemeClr val="dk1"/>
+          </a:lnRef>
+          <a:fillRef idx="1">
+            <a:schemeClr val="lt1"/>
+          </a:fillRef>
+          <a:effectRef idx="0">
+            <a:schemeClr val="dk1"/>
+          </a:effectRef>
+          <a:fontRef idx="minor">
+            <a:schemeClr val="dk1"/>
+          </a:fontRef>
+        </p:style>
+        <p:txBody>
+          <a:bodyPr rtlCol="0" anchor="ctr"/>
+          <a:lstStyle/>
+          <a:p>
+            <a:pPr algn="ctr"/>
+            <a:r>
+              <a:rPr lang="pt-PT" smtClean="0"/>
+              <a:t>A</a:t>
+            </a:r>
+            <a:endParaRPr lang="pt-PT"/>
+          </a:p>
+        </p:txBody>
+      </p:sp>
+      <p:sp>
+        <p:nvSpPr>
+          <p:cNvPr id="19" name="Rectangle 18"/>
+          <p:cNvSpPr/>
+          <p:nvPr/>
+        </p:nvSpPr>
+        <p:spPr>
+          <a:xfrm>
+            <a:off x="4351324" y="1364221"/>
+            <a:ext cx="465666" cy="414866"/>
+          </a:xfrm>
+          <a:prstGeom prst="rect">
+            <a:avLst/>
+          </a:prstGeom>
+        </p:spPr>
+        <p:style>
+          <a:lnRef idx="2">
+            <a:schemeClr val="dk1"/>
+          </a:lnRef>
+          <a:fillRef idx="1">
+            <a:schemeClr val="lt1"/>
+          </a:fillRef>
+          <a:effectRef idx="0">
+            <a:schemeClr val="dk1"/>
+          </a:effectRef>
+          <a:fontRef idx="minor">
+            <a:schemeClr val="dk1"/>
+          </a:fontRef>
+        </p:style>
+        <p:txBody>
+          <a:bodyPr rtlCol="0" anchor="ctr"/>
+          <a:lstStyle/>
+          <a:p>
+            <a:pPr algn="ctr"/>
+            <a:r>
+              <a:rPr lang="pt-PT" smtClean="0"/>
+              <a:t>B</a:t>
+            </a:r>
+            <a:endParaRPr lang="pt-PT"/>
+          </a:p>
+        </p:txBody>
+      </p:sp>
+      <p:sp>
+        <p:nvSpPr>
+          <p:cNvPr id="20" name="Rectangle 19"/>
+          <p:cNvSpPr/>
+          <p:nvPr/>
+        </p:nvSpPr>
+        <p:spPr>
+          <a:xfrm>
+            <a:off x="3991499" y="1918786"/>
+            <a:ext cx="465666" cy="414866"/>
+          </a:xfrm>
+          <a:prstGeom prst="rect">
+            <a:avLst/>
+          </a:prstGeom>
+        </p:spPr>
+        <p:style>
+          <a:lnRef idx="2">
+            <a:schemeClr val="dk1"/>
+          </a:lnRef>
+          <a:fillRef idx="1">
+            <a:schemeClr val="lt1"/>
+          </a:fillRef>
+          <a:effectRef idx="0">
+            <a:schemeClr val="dk1"/>
+          </a:effectRef>
+          <a:fontRef idx="minor">
+            <a:schemeClr val="dk1"/>
+          </a:fontRef>
+        </p:style>
+        <p:txBody>
+          <a:bodyPr rtlCol="0" anchor="ctr"/>
+          <a:lstStyle/>
+          <a:p>
+            <a:pPr algn="ctr"/>
+            <a:r>
+              <a:rPr lang="pt-PT" smtClean="0"/>
+              <a:t>C</a:t>
+            </a:r>
+            <a:endParaRPr lang="pt-PT"/>
+          </a:p>
+        </p:txBody>
+      </p:sp>
+      <p:sp>
+        <p:nvSpPr>
+          <p:cNvPr id="21" name="Rectangle 20"/>
+          <p:cNvSpPr/>
+          <p:nvPr/>
+        </p:nvSpPr>
+        <p:spPr>
+          <a:xfrm>
+            <a:off x="4351325" y="1863751"/>
+            <a:ext cx="465666" cy="414866"/>
+          </a:xfrm>
+          <a:prstGeom prst="rect">
+            <a:avLst/>
+          </a:prstGeom>
+        </p:spPr>
+        <p:style>
+          <a:lnRef idx="2">
+            <a:schemeClr val="dk1"/>
+          </a:lnRef>
+          <a:fillRef idx="1">
+            <a:schemeClr val="lt1"/>
+          </a:fillRef>
+          <a:effectRef idx="0">
+            <a:schemeClr val="dk1"/>
+          </a:effectRef>
+          <a:fontRef idx="minor">
+            <a:schemeClr val="dk1"/>
+          </a:fontRef>
+        </p:style>
+        <p:txBody>
+          <a:bodyPr rtlCol="0" anchor="ctr"/>
+          <a:lstStyle/>
+          <a:p>
+            <a:pPr algn="ctr"/>
+            <a:r>
+              <a:rPr lang="pt-PT" smtClean="0"/>
+              <a:t>D</a:t>
+            </a:r>
+            <a:endParaRPr lang="pt-PT"/>
+          </a:p>
+        </p:txBody>
+      </p:sp>
+      <p:sp>
+        <p:nvSpPr>
+          <p:cNvPr id="22" name="TextBox 21"/>
+          <p:cNvSpPr txBox="1"/>
+          <p:nvPr/>
+        </p:nvSpPr>
+        <p:spPr>
+          <a:xfrm>
+            <a:off x="4143343" y="2216201"/>
+            <a:ext cx="301660" cy="646331"/>
+          </a:xfrm>
+          <a:prstGeom prst="rect">
+            <a:avLst/>
+          </a:prstGeom>
+          <a:noFill/>
+        </p:spPr>
+        <p:txBody>
+          <a:bodyPr wrap="none" rtlCol="0">
+            <a:spAutoFit/>
+          </a:bodyPr>
+          <a:lstStyle/>
+          <a:p>
+            <a:r>
+              <a:rPr lang="pt-PT" smtClean="0"/>
+              <a:t>5</a:t>
+            </a:r>
+          </a:p>
+          <a:p>
+            <a:endParaRPr lang="pt-PT"/>
+          </a:p>
+        </p:txBody>
+      </p:sp>
+      <p:sp>
+        <p:nvSpPr>
+          <p:cNvPr id="23" name="Rectangle 22"/>
+          <p:cNvSpPr/>
+          <p:nvPr/>
+        </p:nvSpPr>
+        <p:spPr>
+          <a:xfrm>
+            <a:off x="3563923" y="1135620"/>
+            <a:ext cx="1253067" cy="1337733"/>
+          </a:xfrm>
+          <a:prstGeom prst="rect">
+            <a:avLst/>
+          </a:prstGeom>
+        </p:spPr>
+        <p:style>
+          <a:lnRef idx="2">
+            <a:schemeClr val="dk1"/>
+          </a:lnRef>
+          <a:fillRef idx="1">
+            <a:schemeClr val="lt1"/>
+          </a:fillRef>
+          <a:effectRef idx="0">
+            <a:schemeClr val="dk1"/>
+          </a:effectRef>
+          <a:fontRef idx="minor">
+            <a:schemeClr val="dk1"/>
+          </a:fontRef>
+        </p:style>
+        <p:txBody>
+          <a:bodyPr rtlCol="0" anchor="ctr"/>
+          <a:lstStyle/>
+          <a:p>
+            <a:pPr algn="ctr"/>
+            <a:endParaRPr lang="pt-PT"/>
+          </a:p>
+        </p:txBody>
+      </p:sp>
+      <p:sp>
+        <p:nvSpPr>
+          <p:cNvPr id="24" name="Rectangle 23"/>
+          <p:cNvSpPr/>
+          <p:nvPr/>
+        </p:nvSpPr>
+        <p:spPr>
+          <a:xfrm>
+            <a:off x="4008439" y="1385394"/>
+            <a:ext cx="465666" cy="414866"/>
+          </a:xfrm>
+          <a:prstGeom prst="rect">
+            <a:avLst/>
+          </a:prstGeom>
+        </p:spPr>
+        <p:style>
+          <a:lnRef idx="2">
+            <a:schemeClr val="dk1"/>
+          </a:lnRef>
+          <a:fillRef idx="1">
+            <a:schemeClr val="lt1"/>
+          </a:fillRef>
+          <a:effectRef idx="0">
+            <a:schemeClr val="dk1"/>
+          </a:effectRef>
+          <a:fontRef idx="minor">
+            <a:schemeClr val="dk1"/>
+          </a:fontRef>
+        </p:style>
+        <p:txBody>
+          <a:bodyPr rtlCol="0" anchor="ctr"/>
+          <a:lstStyle/>
+          <a:p>
+            <a:pPr algn="ctr"/>
+            <a:r>
+              <a:rPr lang="pt-PT" smtClean="0"/>
+              <a:t>A</a:t>
+            </a:r>
+            <a:endParaRPr lang="pt-PT"/>
+          </a:p>
+        </p:txBody>
+      </p:sp>
+      <p:sp>
+        <p:nvSpPr>
+          <p:cNvPr id="25" name="Rectangle 24"/>
+          <p:cNvSpPr/>
+          <p:nvPr/>
+        </p:nvSpPr>
+        <p:spPr>
+          <a:xfrm>
+            <a:off x="4270893" y="1249922"/>
+            <a:ext cx="465666" cy="414866"/>
+          </a:xfrm>
+          <a:prstGeom prst="rect">
+            <a:avLst/>
+          </a:prstGeom>
+        </p:spPr>
+        <p:style>
+          <a:lnRef idx="2">
+            <a:schemeClr val="dk1"/>
+          </a:lnRef>
+          <a:fillRef idx="1">
+            <a:schemeClr val="lt1"/>
+          </a:fillRef>
+          <a:effectRef idx="0">
+            <a:schemeClr val="dk1"/>
+          </a:effectRef>
+          <a:fontRef idx="minor">
+            <a:schemeClr val="dk1"/>
+          </a:fontRef>
+        </p:style>
+        <p:txBody>
+          <a:bodyPr rtlCol="0" anchor="ctr"/>
+          <a:lstStyle/>
+          <a:p>
+            <a:pPr algn="ctr"/>
+            <a:r>
+              <a:rPr lang="pt-PT" smtClean="0"/>
+              <a:t>B</a:t>
+            </a:r>
+            <a:endParaRPr lang="pt-PT"/>
+          </a:p>
+        </p:txBody>
+      </p:sp>
+      <p:sp>
+        <p:nvSpPr>
+          <p:cNvPr id="26" name="Rectangle 25"/>
+          <p:cNvSpPr/>
+          <p:nvPr/>
+        </p:nvSpPr>
+        <p:spPr>
+          <a:xfrm>
+            <a:off x="3974571" y="1817188"/>
+            <a:ext cx="465666" cy="414866"/>
+          </a:xfrm>
+          <a:prstGeom prst="rect">
+            <a:avLst/>
+          </a:prstGeom>
+        </p:spPr>
+        <p:style>
+          <a:lnRef idx="2">
+            <a:schemeClr val="dk1"/>
+          </a:lnRef>
+          <a:fillRef idx="1">
+            <a:schemeClr val="lt1"/>
+          </a:fillRef>
+          <a:effectRef idx="0">
+            <a:schemeClr val="dk1"/>
+          </a:effectRef>
+          <a:fontRef idx="minor">
+            <a:schemeClr val="dk1"/>
+          </a:fontRef>
+        </p:style>
+        <p:txBody>
+          <a:bodyPr rtlCol="0" anchor="ctr"/>
+          <a:lstStyle/>
+          <a:p>
+            <a:pPr algn="ctr"/>
+            <a:r>
+              <a:rPr lang="pt-PT" smtClean="0"/>
+              <a:t>C</a:t>
+            </a:r>
+            <a:endParaRPr lang="pt-PT"/>
+          </a:p>
+        </p:txBody>
+      </p:sp>
+      <p:sp>
+        <p:nvSpPr>
+          <p:cNvPr id="27" name="Rectangle 26"/>
+          <p:cNvSpPr/>
+          <p:nvPr/>
+        </p:nvSpPr>
+        <p:spPr>
+          <a:xfrm>
+            <a:off x="4270894" y="1749452"/>
+            <a:ext cx="465666" cy="414866"/>
+          </a:xfrm>
+          <a:prstGeom prst="rect">
+            <a:avLst/>
+          </a:prstGeom>
+        </p:spPr>
+        <p:style>
+          <a:lnRef idx="2">
+            <a:schemeClr val="dk1"/>
+          </a:lnRef>
+          <a:fillRef idx="1">
+            <a:schemeClr val="lt1"/>
+          </a:fillRef>
+          <a:effectRef idx="0">
+            <a:schemeClr val="dk1"/>
+          </a:effectRef>
+          <a:fontRef idx="minor">
+            <a:schemeClr val="dk1"/>
+          </a:fontRef>
+        </p:style>
+        <p:txBody>
+          <a:bodyPr rtlCol="0" anchor="ctr"/>
+          <a:lstStyle/>
+          <a:p>
+            <a:pPr algn="ctr"/>
+            <a:r>
+              <a:rPr lang="pt-PT" smtClean="0"/>
+              <a:t>D</a:t>
+            </a:r>
+            <a:endParaRPr lang="pt-PT"/>
+          </a:p>
+        </p:txBody>
+      </p:sp>
+      <p:sp>
+        <p:nvSpPr>
+          <p:cNvPr id="28" name="TextBox 27"/>
+          <p:cNvSpPr txBox="1"/>
+          <p:nvPr/>
+        </p:nvSpPr>
+        <p:spPr>
+          <a:xfrm>
+            <a:off x="4050212" y="2089202"/>
+            <a:ext cx="301660" cy="369332"/>
+          </a:xfrm>
+          <a:prstGeom prst="rect">
+            <a:avLst/>
+          </a:prstGeom>
+          <a:noFill/>
+        </p:spPr>
+        <p:txBody>
+          <a:bodyPr wrap="none" rtlCol="0">
+            <a:spAutoFit/>
+          </a:bodyPr>
+          <a:lstStyle/>
+          <a:p>
+            <a:r>
+              <a:rPr lang="pt-PT" smtClean="0"/>
+              <a:t>4</a:t>
+            </a:r>
+            <a:endParaRPr lang="pt-PT"/>
+          </a:p>
+        </p:txBody>
+      </p:sp>
+      <p:sp>
+        <p:nvSpPr>
+          <p:cNvPr id="29" name="Rectangle 28"/>
+          <p:cNvSpPr/>
+          <p:nvPr/>
+        </p:nvSpPr>
+        <p:spPr>
+          <a:xfrm>
+            <a:off x="3490393" y="1046723"/>
+            <a:ext cx="1253067" cy="1337733"/>
+          </a:xfrm>
+          <a:prstGeom prst="rect">
+            <a:avLst/>
+          </a:prstGeom>
+        </p:spPr>
+        <p:style>
+          <a:lnRef idx="2">
+            <a:schemeClr val="dk1"/>
+          </a:lnRef>
+          <a:fillRef idx="1">
+            <a:schemeClr val="lt1"/>
+          </a:fillRef>
+          <a:effectRef idx="0">
+            <a:schemeClr val="dk1"/>
+          </a:effectRef>
+          <a:fontRef idx="minor">
+            <a:schemeClr val="dk1"/>
+          </a:fontRef>
+        </p:style>
+        <p:txBody>
+          <a:bodyPr rtlCol="0" anchor="ctr"/>
+          <a:lstStyle/>
+          <a:p>
+            <a:pPr algn="ctr"/>
+            <a:endParaRPr lang="pt-PT"/>
+          </a:p>
+        </p:txBody>
+      </p:sp>
+      <p:sp>
+        <p:nvSpPr>
+          <p:cNvPr id="30" name="Rectangle 29"/>
+          <p:cNvSpPr/>
+          <p:nvPr/>
+        </p:nvSpPr>
+        <p:spPr>
+          <a:xfrm>
+            <a:off x="3820606" y="1266863"/>
+            <a:ext cx="465666" cy="414866"/>
+          </a:xfrm>
+          <a:prstGeom prst="rect">
+            <a:avLst/>
+          </a:prstGeom>
+        </p:spPr>
+        <p:style>
+          <a:lnRef idx="2">
+            <a:schemeClr val="dk1"/>
+          </a:lnRef>
+          <a:fillRef idx="1">
+            <a:schemeClr val="lt1"/>
+          </a:fillRef>
+          <a:effectRef idx="0">
+            <a:schemeClr val="dk1"/>
+          </a:effectRef>
+          <a:fontRef idx="minor">
+            <a:schemeClr val="dk1"/>
+          </a:fontRef>
+        </p:style>
+        <p:txBody>
+          <a:bodyPr rtlCol="0" anchor="ctr"/>
+          <a:lstStyle/>
+          <a:p>
+            <a:pPr algn="ctr"/>
+            <a:r>
+              <a:rPr lang="pt-PT" smtClean="0"/>
+              <a:t>A</a:t>
+            </a:r>
+            <a:endParaRPr lang="pt-PT"/>
+          </a:p>
+        </p:txBody>
+      </p:sp>
+      <p:sp>
+        <p:nvSpPr>
+          <p:cNvPr id="31" name="Rectangle 30"/>
+          <p:cNvSpPr/>
+          <p:nvPr/>
+        </p:nvSpPr>
+        <p:spPr>
+          <a:xfrm>
+            <a:off x="4207948" y="1173726"/>
+            <a:ext cx="465666" cy="414866"/>
+          </a:xfrm>
+          <a:prstGeom prst="rect">
+            <a:avLst/>
+          </a:prstGeom>
+        </p:spPr>
+        <p:style>
+          <a:lnRef idx="2">
+            <a:schemeClr val="dk1"/>
+          </a:lnRef>
+          <a:fillRef idx="1">
+            <a:schemeClr val="lt1"/>
+          </a:fillRef>
+          <a:effectRef idx="0">
+            <a:schemeClr val="dk1"/>
+          </a:effectRef>
+          <a:fontRef idx="minor">
+            <a:schemeClr val="dk1"/>
+          </a:fontRef>
+        </p:style>
+        <p:txBody>
+          <a:bodyPr rtlCol="0" anchor="ctr"/>
+          <a:lstStyle/>
+          <a:p>
+            <a:pPr algn="ctr"/>
+            <a:r>
+              <a:rPr lang="pt-PT" smtClean="0"/>
+              <a:t>B</a:t>
+            </a:r>
+            <a:endParaRPr lang="pt-PT"/>
+          </a:p>
+        </p:txBody>
+      </p:sp>
+      <p:sp>
+        <p:nvSpPr>
+          <p:cNvPr id="32" name="Rectangle 31"/>
+          <p:cNvSpPr/>
+          <p:nvPr/>
+        </p:nvSpPr>
+        <p:spPr>
+          <a:xfrm>
+            <a:off x="3820606" y="1766393"/>
+            <a:ext cx="465666" cy="414866"/>
+          </a:xfrm>
+          <a:prstGeom prst="rect">
+            <a:avLst/>
+          </a:prstGeom>
+        </p:spPr>
+        <p:style>
+          <a:lnRef idx="2">
+            <a:schemeClr val="dk1"/>
+          </a:lnRef>
+          <a:fillRef idx="1">
+            <a:schemeClr val="lt1"/>
+          </a:fillRef>
+          <a:effectRef idx="0">
+            <a:schemeClr val="dk1"/>
+          </a:effectRef>
+          <a:fontRef idx="minor">
+            <a:schemeClr val="dk1"/>
+          </a:fontRef>
+        </p:style>
+        <p:txBody>
+          <a:bodyPr rtlCol="0" anchor="ctr"/>
+          <a:lstStyle/>
+          <a:p>
+            <a:pPr algn="ctr"/>
+            <a:r>
+              <a:rPr lang="pt-PT" smtClean="0"/>
+              <a:t>C</a:t>
+            </a:r>
+            <a:endParaRPr lang="pt-PT"/>
+          </a:p>
+        </p:txBody>
+      </p:sp>
+      <p:sp>
+        <p:nvSpPr>
+          <p:cNvPr id="33" name="Rectangle 32"/>
+          <p:cNvSpPr/>
+          <p:nvPr/>
+        </p:nvSpPr>
+        <p:spPr>
+          <a:xfrm>
+            <a:off x="4207949" y="1673256"/>
+            <a:ext cx="465666" cy="414866"/>
+          </a:xfrm>
+          <a:prstGeom prst="rect">
+            <a:avLst/>
+          </a:prstGeom>
+        </p:spPr>
+        <p:style>
+          <a:lnRef idx="2">
+            <a:schemeClr val="dk1"/>
+          </a:lnRef>
+          <a:fillRef idx="1">
+            <a:schemeClr val="lt1"/>
+          </a:fillRef>
+          <a:effectRef idx="0">
+            <a:schemeClr val="dk1"/>
+          </a:effectRef>
+          <a:fontRef idx="minor">
+            <a:schemeClr val="dk1"/>
+          </a:fontRef>
+        </p:style>
+        <p:txBody>
+          <a:bodyPr rtlCol="0" anchor="ctr"/>
+          <a:lstStyle/>
+          <a:p>
+            <a:pPr algn="ctr"/>
+            <a:r>
+              <a:rPr lang="pt-PT" smtClean="0"/>
+              <a:t>D</a:t>
+            </a:r>
+            <a:endParaRPr lang="pt-PT"/>
+          </a:p>
+        </p:txBody>
+      </p:sp>
+      <p:sp>
+        <p:nvSpPr>
+          <p:cNvPr id="34" name="TextBox 33"/>
+          <p:cNvSpPr txBox="1"/>
+          <p:nvPr/>
+        </p:nvSpPr>
+        <p:spPr>
+          <a:xfrm>
+            <a:off x="3951282" y="2019355"/>
+            <a:ext cx="301660" cy="369332"/>
+          </a:xfrm>
+          <a:prstGeom prst="rect">
+            <a:avLst/>
+          </a:prstGeom>
+          <a:noFill/>
+        </p:spPr>
+        <p:txBody>
+          <a:bodyPr wrap="none" rtlCol="0">
+            <a:spAutoFit/>
+          </a:bodyPr>
+          <a:lstStyle/>
+          <a:p>
+            <a:r>
+              <a:rPr lang="pt-PT" smtClean="0"/>
+              <a:t>3</a:t>
+            </a:r>
+            <a:endParaRPr lang="pt-PT"/>
+          </a:p>
+        </p:txBody>
+      </p:sp>
+      <p:sp>
+        <p:nvSpPr>
+          <p:cNvPr id="35" name="Rectangle 34"/>
+          <p:cNvSpPr/>
+          <p:nvPr/>
+        </p:nvSpPr>
+        <p:spPr>
+          <a:xfrm>
+            <a:off x="3422658" y="956786"/>
+            <a:ext cx="1253067" cy="1337733"/>
+          </a:xfrm>
+          <a:prstGeom prst="rect">
+            <a:avLst/>
+          </a:prstGeom>
+        </p:spPr>
+        <p:style>
+          <a:lnRef idx="2">
+            <a:schemeClr val="dk1"/>
+          </a:lnRef>
+          <a:fillRef idx="1">
+            <a:schemeClr val="lt1"/>
+          </a:fillRef>
+          <a:effectRef idx="0">
+            <a:schemeClr val="dk1"/>
+          </a:effectRef>
+          <a:fontRef idx="minor">
+            <a:schemeClr val="dk1"/>
+          </a:fontRef>
+        </p:style>
+        <p:txBody>
+          <a:bodyPr rtlCol="0" anchor="ctr"/>
+          <a:lstStyle/>
+          <a:p>
+            <a:pPr algn="ctr"/>
+            <a:endParaRPr lang="pt-PT"/>
+          </a:p>
+        </p:txBody>
+      </p:sp>
+      <p:sp>
+        <p:nvSpPr>
+          <p:cNvPr id="36" name="Rectangle 35"/>
+          <p:cNvSpPr/>
+          <p:nvPr/>
+        </p:nvSpPr>
+        <p:spPr>
+          <a:xfrm>
+            <a:off x="3617400" y="1126124"/>
+            <a:ext cx="465666" cy="414866"/>
+          </a:xfrm>
+          <a:prstGeom prst="rect">
+            <a:avLst/>
+          </a:prstGeom>
+        </p:spPr>
+        <p:style>
+          <a:lnRef idx="2">
+            <a:schemeClr val="dk1"/>
+          </a:lnRef>
+          <a:fillRef idx="1">
+            <a:schemeClr val="lt1"/>
+          </a:fillRef>
+          <a:effectRef idx="0">
+            <a:schemeClr val="dk1"/>
+          </a:effectRef>
+          <a:fontRef idx="minor">
+            <a:schemeClr val="dk1"/>
+          </a:fontRef>
+        </p:style>
+        <p:txBody>
+          <a:bodyPr rtlCol="0" anchor="ctr"/>
+          <a:lstStyle/>
+          <a:p>
+            <a:pPr algn="ctr"/>
+            <a:r>
+              <a:rPr lang="pt-PT" smtClean="0"/>
+              <a:t>A</a:t>
+            </a:r>
+            <a:endParaRPr lang="pt-PT"/>
+          </a:p>
+        </p:txBody>
+      </p:sp>
+      <p:sp>
+        <p:nvSpPr>
+          <p:cNvPr id="37" name="Rectangle 36"/>
+          <p:cNvSpPr/>
+          <p:nvPr/>
+        </p:nvSpPr>
+        <p:spPr>
+          <a:xfrm>
+            <a:off x="4133863" y="1126124"/>
+            <a:ext cx="465666" cy="414866"/>
+          </a:xfrm>
+          <a:prstGeom prst="rect">
+            <a:avLst/>
+          </a:prstGeom>
+        </p:spPr>
+        <p:style>
+          <a:lnRef idx="2">
+            <a:schemeClr val="dk1"/>
+          </a:lnRef>
+          <a:fillRef idx="1">
+            <a:schemeClr val="lt1"/>
+          </a:fillRef>
+          <a:effectRef idx="0">
+            <a:schemeClr val="dk1"/>
+          </a:effectRef>
+          <a:fontRef idx="minor">
+            <a:schemeClr val="dk1"/>
+          </a:fontRef>
+        </p:style>
+        <p:txBody>
+          <a:bodyPr rtlCol="0" anchor="ctr"/>
+          <a:lstStyle/>
+          <a:p>
+            <a:pPr algn="ctr"/>
+            <a:r>
+              <a:rPr lang="pt-PT" smtClean="0"/>
+              <a:t>B</a:t>
+            </a:r>
+            <a:endParaRPr lang="pt-PT"/>
+          </a:p>
+        </p:txBody>
+      </p:sp>
+      <p:sp>
+        <p:nvSpPr>
+          <p:cNvPr id="38" name="Rectangle 37"/>
+          <p:cNvSpPr/>
+          <p:nvPr/>
+        </p:nvSpPr>
+        <p:spPr>
+          <a:xfrm>
+            <a:off x="3617400" y="1625654"/>
+            <a:ext cx="465666" cy="414866"/>
+          </a:xfrm>
+          <a:prstGeom prst="rect">
+            <a:avLst/>
+          </a:prstGeom>
+        </p:spPr>
+        <p:style>
+          <a:lnRef idx="2">
+            <a:schemeClr val="dk1"/>
+          </a:lnRef>
+          <a:fillRef idx="1">
+            <a:schemeClr val="lt1"/>
+          </a:fillRef>
+          <a:effectRef idx="0">
+            <a:schemeClr val="dk1"/>
+          </a:effectRef>
+          <a:fontRef idx="minor">
+            <a:schemeClr val="dk1"/>
+          </a:fontRef>
+        </p:style>
+        <p:txBody>
+          <a:bodyPr rtlCol="0" anchor="ctr"/>
+          <a:lstStyle/>
+          <a:p>
+            <a:pPr algn="ctr"/>
+            <a:r>
+              <a:rPr lang="pt-PT" smtClean="0"/>
+              <a:t>C</a:t>
+            </a:r>
+            <a:endParaRPr lang="pt-PT"/>
+          </a:p>
+        </p:txBody>
+      </p:sp>
+      <p:sp>
+        <p:nvSpPr>
+          <p:cNvPr id="39" name="Rectangle 38"/>
+          <p:cNvSpPr/>
+          <p:nvPr/>
+        </p:nvSpPr>
+        <p:spPr>
+          <a:xfrm>
+            <a:off x="4133864" y="1625654"/>
+            <a:ext cx="465666" cy="414866"/>
+          </a:xfrm>
+          <a:prstGeom prst="rect">
+            <a:avLst/>
+          </a:prstGeom>
+        </p:spPr>
+        <p:style>
+          <a:lnRef idx="2">
+            <a:schemeClr val="dk1"/>
+          </a:lnRef>
+          <a:fillRef idx="1">
+            <a:schemeClr val="lt1"/>
+          </a:fillRef>
+          <a:effectRef idx="0">
+            <a:schemeClr val="dk1"/>
+          </a:effectRef>
+          <a:fontRef idx="minor">
+            <a:schemeClr val="dk1"/>
+          </a:fontRef>
+        </p:style>
+        <p:txBody>
+          <a:bodyPr rtlCol="0" anchor="ctr"/>
+          <a:lstStyle/>
+          <a:p>
+            <a:pPr algn="ctr"/>
+            <a:r>
+              <a:rPr lang="pt-PT" smtClean="0"/>
+              <a:t>D</a:t>
+            </a:r>
+            <a:endParaRPr lang="pt-PT"/>
+          </a:p>
+        </p:txBody>
+      </p:sp>
+      <p:sp>
+        <p:nvSpPr>
+          <p:cNvPr id="40" name="TextBox 39"/>
+          <p:cNvSpPr txBox="1"/>
+          <p:nvPr/>
+        </p:nvSpPr>
+        <p:spPr>
+          <a:xfrm>
+            <a:off x="3904714" y="1942118"/>
+            <a:ext cx="301660" cy="369332"/>
+          </a:xfrm>
+          <a:prstGeom prst="rect">
+            <a:avLst/>
+          </a:prstGeom>
+          <a:noFill/>
+        </p:spPr>
+        <p:txBody>
+          <a:bodyPr wrap="none" rtlCol="0">
+            <a:spAutoFit/>
+          </a:bodyPr>
+          <a:lstStyle/>
+          <a:p>
+            <a:r>
+              <a:rPr lang="pt-PT" smtClean="0"/>
+              <a:t>2</a:t>
+            </a:r>
+            <a:endParaRPr lang="pt-PT"/>
+          </a:p>
+        </p:txBody>
+      </p:sp>
+      <p:sp>
+        <p:nvSpPr>
+          <p:cNvPr id="41" name="Rectangle 40"/>
+          <p:cNvSpPr/>
+          <p:nvPr/>
+        </p:nvSpPr>
+        <p:spPr>
+          <a:xfrm>
+            <a:off x="3356503" y="867887"/>
+            <a:ext cx="1253067" cy="1337733"/>
+          </a:xfrm>
+          <a:prstGeom prst="rect">
+            <a:avLst/>
+          </a:prstGeom>
+        </p:spPr>
+        <p:style>
+          <a:lnRef idx="2">
+            <a:schemeClr val="dk1"/>
+          </a:lnRef>
+          <a:fillRef idx="1">
+            <a:schemeClr val="lt1"/>
+          </a:fillRef>
+          <a:effectRef idx="0">
+            <a:schemeClr val="dk1"/>
+          </a:effectRef>
+          <a:fontRef idx="minor">
+            <a:schemeClr val="dk1"/>
+          </a:fontRef>
+        </p:style>
+        <p:txBody>
+          <a:bodyPr rtlCol="0" anchor="ctr"/>
+          <a:lstStyle/>
+          <a:p>
+            <a:pPr algn="ctr"/>
+            <a:endParaRPr lang="pt-PT"/>
+          </a:p>
+        </p:txBody>
+      </p:sp>
+      <p:sp>
+        <p:nvSpPr>
+          <p:cNvPr id="42" name="Rectangle 41"/>
+          <p:cNvSpPr/>
+          <p:nvPr/>
+        </p:nvSpPr>
+        <p:spPr>
+          <a:xfrm>
+            <a:off x="3475042" y="956789"/>
+            <a:ext cx="465666" cy="414866"/>
+          </a:xfrm>
+          <a:prstGeom prst="rect">
+            <a:avLst/>
+          </a:prstGeom>
+        </p:spPr>
+        <p:style>
+          <a:lnRef idx="2">
+            <a:schemeClr val="dk1"/>
+          </a:lnRef>
+          <a:fillRef idx="1">
+            <a:schemeClr val="lt1"/>
+          </a:fillRef>
+          <a:effectRef idx="0">
+            <a:schemeClr val="dk1"/>
+          </a:effectRef>
+          <a:fontRef idx="minor">
+            <a:schemeClr val="dk1"/>
+          </a:fontRef>
+        </p:style>
+        <p:txBody>
+          <a:bodyPr rtlCol="0" anchor="ctr"/>
+          <a:lstStyle/>
+          <a:p>
+            <a:pPr algn="ctr"/>
+            <a:r>
+              <a:rPr lang="pt-PT" smtClean="0"/>
+              <a:t>A</a:t>
+            </a:r>
+            <a:endParaRPr lang="pt-PT"/>
+          </a:p>
+        </p:txBody>
+      </p:sp>
+      <p:sp>
+        <p:nvSpPr>
+          <p:cNvPr id="43" name="Rectangle 42"/>
+          <p:cNvSpPr/>
+          <p:nvPr/>
+        </p:nvSpPr>
+        <p:spPr>
+          <a:xfrm>
+            <a:off x="4025373" y="956789"/>
+            <a:ext cx="465666" cy="414866"/>
+          </a:xfrm>
+          <a:prstGeom prst="rect">
+            <a:avLst/>
+          </a:prstGeom>
+        </p:spPr>
+        <p:style>
+          <a:lnRef idx="2">
+            <a:schemeClr val="dk1"/>
+          </a:lnRef>
+          <a:fillRef idx="1">
+            <a:schemeClr val="lt1"/>
+          </a:fillRef>
+          <a:effectRef idx="0">
+            <a:schemeClr val="dk1"/>
+          </a:effectRef>
+          <a:fontRef idx="minor">
+            <a:schemeClr val="dk1"/>
+          </a:fontRef>
+        </p:style>
+        <p:txBody>
+          <a:bodyPr rtlCol="0" anchor="ctr"/>
+          <a:lstStyle/>
+          <a:p>
+            <a:pPr algn="ctr"/>
+            <a:r>
+              <a:rPr lang="pt-PT" smtClean="0"/>
+              <a:t>B</a:t>
+            </a:r>
+            <a:endParaRPr lang="pt-PT"/>
+          </a:p>
+        </p:txBody>
+      </p:sp>
+      <p:sp>
+        <p:nvSpPr>
+          <p:cNvPr id="44" name="Rectangle 43"/>
+          <p:cNvSpPr/>
+          <p:nvPr/>
+        </p:nvSpPr>
+        <p:spPr>
+          <a:xfrm>
+            <a:off x="3475042" y="1456319"/>
+            <a:ext cx="465666" cy="414866"/>
+          </a:xfrm>
+          <a:prstGeom prst="rect">
+            <a:avLst/>
+          </a:prstGeom>
+        </p:spPr>
+        <p:style>
+          <a:lnRef idx="2">
+            <a:schemeClr val="dk1"/>
+          </a:lnRef>
+          <a:fillRef idx="1">
+            <a:schemeClr val="lt1"/>
+          </a:fillRef>
+          <a:effectRef idx="0">
+            <a:schemeClr val="dk1"/>
+          </a:effectRef>
+          <a:fontRef idx="minor">
+            <a:schemeClr val="dk1"/>
+          </a:fontRef>
+        </p:style>
+        <p:txBody>
+          <a:bodyPr rtlCol="0" anchor="ctr"/>
+          <a:lstStyle/>
+          <a:p>
+            <a:pPr algn="ctr"/>
+            <a:r>
+              <a:rPr lang="pt-PT" smtClean="0"/>
+              <a:t>C</a:t>
+            </a:r>
+            <a:endParaRPr lang="pt-PT"/>
+          </a:p>
+        </p:txBody>
+      </p:sp>
+      <p:sp>
+        <p:nvSpPr>
+          <p:cNvPr id="45" name="Rectangle 44"/>
+          <p:cNvSpPr/>
+          <p:nvPr/>
+        </p:nvSpPr>
+        <p:spPr>
+          <a:xfrm>
+            <a:off x="4025374" y="1456319"/>
+            <a:ext cx="465666" cy="414866"/>
+          </a:xfrm>
+          <a:prstGeom prst="rect">
+            <a:avLst/>
+          </a:prstGeom>
+        </p:spPr>
+        <p:style>
+          <a:lnRef idx="2">
+            <a:schemeClr val="dk1"/>
+          </a:lnRef>
+          <a:fillRef idx="1">
+            <a:schemeClr val="lt1"/>
+          </a:fillRef>
+          <a:effectRef idx="0">
+            <a:schemeClr val="dk1"/>
+          </a:effectRef>
+          <a:fontRef idx="minor">
+            <a:schemeClr val="dk1"/>
+          </a:fontRef>
+        </p:style>
+        <p:txBody>
+          <a:bodyPr rtlCol="0" anchor="ctr"/>
+          <a:lstStyle/>
+          <a:p>
+            <a:pPr algn="ctr"/>
+            <a:r>
+              <a:rPr lang="pt-PT" smtClean="0"/>
+              <a:t>D</a:t>
+            </a:r>
+            <a:endParaRPr lang="pt-PT"/>
+          </a:p>
+        </p:txBody>
+      </p:sp>
+      <p:sp>
+        <p:nvSpPr>
+          <p:cNvPr id="46" name="TextBox 45"/>
+          <p:cNvSpPr txBox="1"/>
+          <p:nvPr/>
+        </p:nvSpPr>
+        <p:spPr>
+          <a:xfrm>
+            <a:off x="3849142" y="1840519"/>
+            <a:ext cx="301660" cy="369332"/>
+          </a:xfrm>
+          <a:prstGeom prst="rect">
+            <a:avLst/>
+          </a:prstGeom>
+          <a:noFill/>
+        </p:spPr>
+        <p:txBody>
+          <a:bodyPr wrap="none" rtlCol="0">
+            <a:spAutoFit/>
+          </a:bodyPr>
+          <a:lstStyle/>
+          <a:p>
+            <a:r>
+              <a:rPr lang="pt-PT" smtClean="0"/>
+              <a:t>1</a:t>
+            </a:r>
+            <a:endParaRPr lang="pt-PT"/>
+          </a:p>
+        </p:txBody>
+      </p:sp>
+    </p:spTree>
+    <p:extLst>
+      <p:ext uri="{BB962C8B-B14F-4D97-AF65-F5344CB8AC3E}">
+        <p14:creationId xmlns:p14="http://schemas.microsoft.com/office/powerpoint/2010/main" val="2615721202"/>
       </p:ext>
     </p:extLst>
   </p:cSld>

</xml_diff>

<commit_message>
Refatoramento do código fonte do capítulo 4
</commit_message>
<xml_diff>
--- a/livro/figuras-estrutura-dados.pptx
+++ b/livro/figuras-estrutura-dados.pptx
@@ -9,6 +9,8 @@
     <p:sldId id="257" r:id="rId3"/>
     <p:sldId id="258" r:id="rId4"/>
     <p:sldId id="259" r:id="rId5"/>
+    <p:sldId id="260" r:id="rId6"/>
+    <p:sldId id="261" r:id="rId7"/>
   </p:sldIdLst>
   <p:sldSz cx="9144000" cy="6858000" type="screen4x3"/>
   <p:notesSz cx="6858000" cy="9144000"/>
@@ -291,7 +293,7 @@
           <a:p>
             <a:fld id="{55A800BC-7198-8F46-BF2F-34554785D7CB}" type="datetimeFigureOut">
               <a:rPr lang="en-US" smtClean="0"/>
-              <a:t>11/11/13</a:t>
+              <a:t>12/11/13</a:t>
             </a:fld>
             <a:endParaRPr lang="pt-BR"/>
           </a:p>
@@ -461,7 +463,7 @@
           <a:p>
             <a:fld id="{55A800BC-7198-8F46-BF2F-34554785D7CB}" type="datetimeFigureOut">
               <a:rPr lang="en-US" smtClean="0"/>
-              <a:t>11/11/13</a:t>
+              <a:t>12/11/13</a:t>
             </a:fld>
             <a:endParaRPr lang="pt-BR"/>
           </a:p>
@@ -641,7 +643,7 @@
           <a:p>
             <a:fld id="{55A800BC-7198-8F46-BF2F-34554785D7CB}" type="datetimeFigureOut">
               <a:rPr lang="en-US" smtClean="0"/>
-              <a:t>11/11/13</a:t>
+              <a:t>12/11/13</a:t>
             </a:fld>
             <a:endParaRPr lang="pt-BR"/>
           </a:p>
@@ -811,7 +813,7 @@
           <a:p>
             <a:fld id="{55A800BC-7198-8F46-BF2F-34554785D7CB}" type="datetimeFigureOut">
               <a:rPr lang="en-US" smtClean="0"/>
-              <a:t>11/11/13</a:t>
+              <a:t>12/11/13</a:t>
             </a:fld>
             <a:endParaRPr lang="pt-BR"/>
           </a:p>
@@ -1057,7 +1059,7 @@
           <a:p>
             <a:fld id="{55A800BC-7198-8F46-BF2F-34554785D7CB}" type="datetimeFigureOut">
               <a:rPr lang="en-US" smtClean="0"/>
-              <a:t>11/11/13</a:t>
+              <a:t>12/11/13</a:t>
             </a:fld>
             <a:endParaRPr lang="pt-BR"/>
           </a:p>
@@ -1345,7 +1347,7 @@
           <a:p>
             <a:fld id="{55A800BC-7198-8F46-BF2F-34554785D7CB}" type="datetimeFigureOut">
               <a:rPr lang="en-US" smtClean="0"/>
-              <a:t>11/11/13</a:t>
+              <a:t>12/11/13</a:t>
             </a:fld>
             <a:endParaRPr lang="pt-BR"/>
           </a:p>
@@ -1767,7 +1769,7 @@
           <a:p>
             <a:fld id="{55A800BC-7198-8F46-BF2F-34554785D7CB}" type="datetimeFigureOut">
               <a:rPr lang="en-US" smtClean="0"/>
-              <a:t>11/11/13</a:t>
+              <a:t>12/11/13</a:t>
             </a:fld>
             <a:endParaRPr lang="pt-BR"/>
           </a:p>
@@ -1885,7 +1887,7 @@
           <a:p>
             <a:fld id="{55A800BC-7198-8F46-BF2F-34554785D7CB}" type="datetimeFigureOut">
               <a:rPr lang="en-US" smtClean="0"/>
-              <a:t>11/11/13</a:t>
+              <a:t>12/11/13</a:t>
             </a:fld>
             <a:endParaRPr lang="pt-BR"/>
           </a:p>
@@ -1980,7 +1982,7 @@
           <a:p>
             <a:fld id="{55A800BC-7198-8F46-BF2F-34554785D7CB}" type="datetimeFigureOut">
               <a:rPr lang="en-US" smtClean="0"/>
-              <a:t>11/11/13</a:t>
+              <a:t>12/11/13</a:t>
             </a:fld>
             <a:endParaRPr lang="pt-BR"/>
           </a:p>
@@ -2257,7 +2259,7 @@
           <a:p>
             <a:fld id="{55A800BC-7198-8F46-BF2F-34554785D7CB}" type="datetimeFigureOut">
               <a:rPr lang="en-US" smtClean="0"/>
-              <a:t>11/11/13</a:t>
+              <a:t>12/11/13</a:t>
             </a:fld>
             <a:endParaRPr lang="pt-BR"/>
           </a:p>
@@ -2510,7 +2512,7 @@
           <a:p>
             <a:fld id="{55A800BC-7198-8F46-BF2F-34554785D7CB}" type="datetimeFigureOut">
               <a:rPr lang="en-US" smtClean="0"/>
-              <a:t>11/11/13</a:t>
+              <a:t>12/11/13</a:t>
             </a:fld>
             <a:endParaRPr lang="pt-BR"/>
           </a:p>
@@ -2723,7 +2725,7 @@
           <a:p>
             <a:fld id="{55A800BC-7198-8F46-BF2F-34554785D7CB}" type="datetimeFigureOut">
               <a:rPr lang="en-US" smtClean="0"/>
-              <a:t>11/11/13</a:t>
+              <a:t>12/11/13</a:t>
             </a:fld>
             <a:endParaRPr lang="pt-BR"/>
           </a:p>
@@ -5927,6 +5929,3372 @@
     <p:extLst>
       <p:ext uri="{BB962C8B-B14F-4D97-AF65-F5344CB8AC3E}">
         <p14:creationId xmlns:p14="http://schemas.microsoft.com/office/powerpoint/2010/main" val="2615721202"/>
+      </p:ext>
+    </p:extLst>
+  </p:cSld>
+  <p:clrMapOvr>
+    <a:masterClrMapping/>
+  </p:clrMapOvr>
+</p:sld>
+</file>
+
+<file path=ppt/slides/slide5.xml><?xml version="1.0" encoding="utf-8"?>
+<p:sld xmlns:a="http://schemas.openxmlformats.org/drawingml/2006/main" xmlns:r="http://schemas.openxmlformats.org/officeDocument/2006/relationships" xmlns:p="http://schemas.openxmlformats.org/presentationml/2006/main">
+  <p:cSld>
+    <p:spTree>
+      <p:nvGrpSpPr>
+        <p:cNvPr id="1" name=""/>
+        <p:cNvGrpSpPr/>
+        <p:nvPr/>
+      </p:nvGrpSpPr>
+      <p:grpSpPr>
+        <a:xfrm>
+          <a:off x="0" y="0"/>
+          <a:ext cx="0" cy="0"/>
+          <a:chOff x="0" y="0"/>
+          <a:chExt cx="0" cy="0"/>
+        </a:xfrm>
+      </p:grpSpPr>
+      <p:sp>
+        <p:nvSpPr>
+          <p:cNvPr id="5" name="Rectangle 4"/>
+          <p:cNvSpPr/>
+          <p:nvPr/>
+        </p:nvSpPr>
+        <p:spPr>
+          <a:xfrm>
+            <a:off x="3141140" y="1940699"/>
+            <a:ext cx="364065" cy="321733"/>
+          </a:xfrm>
+          <a:prstGeom prst="rect">
+            <a:avLst/>
+          </a:prstGeom>
+          <a:ln>
+            <a:solidFill>
+              <a:schemeClr val="tx1"/>
+            </a:solidFill>
+          </a:ln>
+          <a:effectLst/>
+        </p:spPr>
+        <p:style>
+          <a:lnRef idx="2">
+            <a:schemeClr val="accent1"/>
+          </a:lnRef>
+          <a:fillRef idx="1">
+            <a:schemeClr val="lt1"/>
+          </a:fillRef>
+          <a:effectRef idx="0">
+            <a:schemeClr val="accent1"/>
+          </a:effectRef>
+          <a:fontRef idx="minor">
+            <a:schemeClr val="dk1"/>
+          </a:fontRef>
+        </p:style>
+        <p:txBody>
+          <a:bodyPr rtlCol="0" anchor="ctr"/>
+          <a:lstStyle/>
+          <a:p>
+            <a:pPr algn="ctr"/>
+            <a:r>
+              <a:rPr lang="pt-BR" sz="1400" dirty="0" smtClean="0"/>
+              <a:t>15</a:t>
+            </a:r>
+            <a:endParaRPr lang="pt-BR" sz="1400" dirty="0"/>
+          </a:p>
+        </p:txBody>
+      </p:sp>
+      <p:sp>
+        <p:nvSpPr>
+          <p:cNvPr id="6" name="Rectangle 5"/>
+          <p:cNvSpPr/>
+          <p:nvPr/>
+        </p:nvSpPr>
+        <p:spPr>
+          <a:xfrm>
+            <a:off x="3505205" y="1940699"/>
+            <a:ext cx="364065" cy="321733"/>
+          </a:xfrm>
+          <a:prstGeom prst="rect">
+            <a:avLst/>
+          </a:prstGeom>
+          <a:ln>
+            <a:solidFill>
+              <a:schemeClr val="tx1"/>
+            </a:solidFill>
+          </a:ln>
+          <a:effectLst/>
+        </p:spPr>
+        <p:style>
+          <a:lnRef idx="2">
+            <a:schemeClr val="accent1"/>
+          </a:lnRef>
+          <a:fillRef idx="1">
+            <a:schemeClr val="lt1"/>
+          </a:fillRef>
+          <a:effectRef idx="0">
+            <a:schemeClr val="accent1"/>
+          </a:effectRef>
+          <a:fontRef idx="minor">
+            <a:schemeClr val="dk1"/>
+          </a:fontRef>
+        </p:style>
+        <p:txBody>
+          <a:bodyPr rtlCol="0" anchor="ctr"/>
+          <a:lstStyle/>
+          <a:p>
+            <a:pPr algn="ctr"/>
+            <a:endParaRPr lang="pt-BR" sz="1400"/>
+          </a:p>
+        </p:txBody>
+      </p:sp>
+      <p:sp>
+        <p:nvSpPr>
+          <p:cNvPr id="7" name="Rectangle 6"/>
+          <p:cNvSpPr/>
+          <p:nvPr/>
+        </p:nvSpPr>
+        <p:spPr>
+          <a:xfrm>
+            <a:off x="4224873" y="1940699"/>
+            <a:ext cx="364065" cy="321733"/>
+          </a:xfrm>
+          <a:prstGeom prst="rect">
+            <a:avLst/>
+          </a:prstGeom>
+          <a:ln>
+            <a:solidFill>
+              <a:schemeClr val="tx1"/>
+            </a:solidFill>
+          </a:ln>
+          <a:effectLst/>
+        </p:spPr>
+        <p:style>
+          <a:lnRef idx="2">
+            <a:schemeClr val="accent1"/>
+          </a:lnRef>
+          <a:fillRef idx="1">
+            <a:schemeClr val="lt1"/>
+          </a:fillRef>
+          <a:effectRef idx="0">
+            <a:schemeClr val="accent1"/>
+          </a:effectRef>
+          <a:fontRef idx="minor">
+            <a:schemeClr val="dk1"/>
+          </a:fontRef>
+        </p:style>
+        <p:txBody>
+          <a:bodyPr rtlCol="0" anchor="ctr"/>
+          <a:lstStyle/>
+          <a:p>
+            <a:pPr algn="ctr"/>
+            <a:r>
+              <a:rPr lang="pt-BR" sz="1400" dirty="0" smtClean="0"/>
+              <a:t>30</a:t>
+            </a:r>
+            <a:endParaRPr lang="pt-BR" sz="1400" dirty="0"/>
+          </a:p>
+        </p:txBody>
+      </p:sp>
+      <p:sp>
+        <p:nvSpPr>
+          <p:cNvPr id="8" name="Rectangle 7"/>
+          <p:cNvSpPr/>
+          <p:nvPr/>
+        </p:nvSpPr>
+        <p:spPr>
+          <a:xfrm>
+            <a:off x="4588938" y="1940699"/>
+            <a:ext cx="364065" cy="321733"/>
+          </a:xfrm>
+          <a:prstGeom prst="rect">
+            <a:avLst/>
+          </a:prstGeom>
+          <a:ln>
+            <a:solidFill>
+              <a:schemeClr val="tx1"/>
+            </a:solidFill>
+          </a:ln>
+          <a:effectLst/>
+        </p:spPr>
+        <p:style>
+          <a:lnRef idx="2">
+            <a:schemeClr val="accent1"/>
+          </a:lnRef>
+          <a:fillRef idx="1">
+            <a:schemeClr val="lt1"/>
+          </a:fillRef>
+          <a:effectRef idx="0">
+            <a:schemeClr val="accent1"/>
+          </a:effectRef>
+          <a:fontRef idx="minor">
+            <a:schemeClr val="dk1"/>
+          </a:fontRef>
+        </p:style>
+        <p:txBody>
+          <a:bodyPr rtlCol="0" anchor="ctr"/>
+          <a:lstStyle/>
+          <a:p>
+            <a:pPr algn="ctr"/>
+            <a:endParaRPr lang="pt-BR" sz="1400"/>
+          </a:p>
+        </p:txBody>
+      </p:sp>
+      <p:sp>
+        <p:nvSpPr>
+          <p:cNvPr id="9" name="Rectangle 8"/>
+          <p:cNvSpPr/>
+          <p:nvPr/>
+        </p:nvSpPr>
+        <p:spPr>
+          <a:xfrm>
+            <a:off x="5300140" y="1940699"/>
+            <a:ext cx="364065" cy="321733"/>
+          </a:xfrm>
+          <a:prstGeom prst="rect">
+            <a:avLst/>
+          </a:prstGeom>
+          <a:ln>
+            <a:solidFill>
+              <a:schemeClr val="tx1"/>
+            </a:solidFill>
+          </a:ln>
+          <a:effectLst/>
+        </p:spPr>
+        <p:style>
+          <a:lnRef idx="2">
+            <a:schemeClr val="accent1"/>
+          </a:lnRef>
+          <a:fillRef idx="1">
+            <a:schemeClr val="lt1"/>
+          </a:fillRef>
+          <a:effectRef idx="0">
+            <a:schemeClr val="accent1"/>
+          </a:effectRef>
+          <a:fontRef idx="minor">
+            <a:schemeClr val="dk1"/>
+          </a:fontRef>
+        </p:style>
+        <p:txBody>
+          <a:bodyPr rtlCol="0" anchor="ctr"/>
+          <a:lstStyle/>
+          <a:p>
+            <a:pPr algn="ctr"/>
+            <a:r>
+              <a:rPr lang="pt-BR" sz="1400" dirty="0" smtClean="0"/>
+              <a:t>6</a:t>
+            </a:r>
+            <a:endParaRPr lang="pt-BR" sz="1400" dirty="0"/>
+          </a:p>
+        </p:txBody>
+      </p:sp>
+      <p:sp>
+        <p:nvSpPr>
+          <p:cNvPr id="10" name="Rectangle 9"/>
+          <p:cNvSpPr/>
+          <p:nvPr/>
+        </p:nvSpPr>
+        <p:spPr>
+          <a:xfrm>
+            <a:off x="5664205" y="1940699"/>
+            <a:ext cx="364065" cy="321733"/>
+          </a:xfrm>
+          <a:prstGeom prst="rect">
+            <a:avLst/>
+          </a:prstGeom>
+          <a:ln>
+            <a:solidFill>
+              <a:schemeClr val="tx1"/>
+            </a:solidFill>
+          </a:ln>
+          <a:effectLst/>
+        </p:spPr>
+        <p:style>
+          <a:lnRef idx="2">
+            <a:schemeClr val="accent1"/>
+          </a:lnRef>
+          <a:fillRef idx="1">
+            <a:schemeClr val="lt1"/>
+          </a:fillRef>
+          <a:effectRef idx="0">
+            <a:schemeClr val="accent1"/>
+          </a:effectRef>
+          <a:fontRef idx="minor">
+            <a:schemeClr val="dk1"/>
+          </a:fontRef>
+        </p:style>
+        <p:txBody>
+          <a:bodyPr rtlCol="0" anchor="ctr"/>
+          <a:lstStyle/>
+          <a:p>
+            <a:pPr algn="ctr"/>
+            <a:endParaRPr lang="pt-BR" sz="1400"/>
+          </a:p>
+        </p:txBody>
+      </p:sp>
+      <p:sp>
+        <p:nvSpPr>
+          <p:cNvPr id="11" name="Rectangle 10"/>
+          <p:cNvSpPr/>
+          <p:nvPr/>
+        </p:nvSpPr>
+        <p:spPr>
+          <a:xfrm>
+            <a:off x="4572010" y="2931299"/>
+            <a:ext cx="364065" cy="321733"/>
+          </a:xfrm>
+          <a:prstGeom prst="rect">
+            <a:avLst/>
+          </a:prstGeom>
+          <a:ln>
+            <a:solidFill>
+              <a:schemeClr val="tx1"/>
+            </a:solidFill>
+          </a:ln>
+          <a:effectLst/>
+        </p:spPr>
+        <p:style>
+          <a:lnRef idx="2">
+            <a:schemeClr val="accent1"/>
+          </a:lnRef>
+          <a:fillRef idx="1">
+            <a:schemeClr val="lt1"/>
+          </a:fillRef>
+          <a:effectRef idx="0">
+            <a:schemeClr val="accent1"/>
+          </a:effectRef>
+          <a:fontRef idx="minor">
+            <a:schemeClr val="dk1"/>
+          </a:fontRef>
+        </p:style>
+        <p:txBody>
+          <a:bodyPr rtlCol="0" anchor="ctr"/>
+          <a:lstStyle/>
+          <a:p>
+            <a:pPr algn="ctr"/>
+            <a:r>
+              <a:rPr lang="pt-BR" sz="1400" dirty="0" smtClean="0"/>
+              <a:t>7</a:t>
+            </a:r>
+            <a:endParaRPr lang="pt-BR" sz="1400" dirty="0"/>
+          </a:p>
+        </p:txBody>
+      </p:sp>
+      <p:sp>
+        <p:nvSpPr>
+          <p:cNvPr id="12" name="Rectangle 11"/>
+          <p:cNvSpPr/>
+          <p:nvPr/>
+        </p:nvSpPr>
+        <p:spPr>
+          <a:xfrm>
+            <a:off x="4936075" y="2931299"/>
+            <a:ext cx="364065" cy="321733"/>
+          </a:xfrm>
+          <a:prstGeom prst="rect">
+            <a:avLst/>
+          </a:prstGeom>
+          <a:ln>
+            <a:solidFill>
+              <a:schemeClr val="tx1"/>
+            </a:solidFill>
+          </a:ln>
+          <a:effectLst/>
+        </p:spPr>
+        <p:style>
+          <a:lnRef idx="2">
+            <a:schemeClr val="accent1"/>
+          </a:lnRef>
+          <a:fillRef idx="1">
+            <a:schemeClr val="lt1"/>
+          </a:fillRef>
+          <a:effectRef idx="0">
+            <a:schemeClr val="accent1"/>
+          </a:effectRef>
+          <a:fontRef idx="minor">
+            <a:schemeClr val="dk1"/>
+          </a:fontRef>
+        </p:style>
+        <p:txBody>
+          <a:bodyPr rtlCol="0" anchor="ctr"/>
+          <a:lstStyle/>
+          <a:p>
+            <a:pPr algn="ctr"/>
+            <a:endParaRPr lang="pt-BR" sz="1400"/>
+          </a:p>
+        </p:txBody>
+      </p:sp>
+      <p:sp>
+        <p:nvSpPr>
+          <p:cNvPr id="13" name="Rectangle 12"/>
+          <p:cNvSpPr/>
+          <p:nvPr/>
+        </p:nvSpPr>
+        <p:spPr>
+          <a:xfrm>
+            <a:off x="6405042" y="1940699"/>
+            <a:ext cx="364065" cy="321733"/>
+          </a:xfrm>
+          <a:prstGeom prst="rect">
+            <a:avLst/>
+          </a:prstGeom>
+          <a:ln>
+            <a:solidFill>
+              <a:schemeClr val="tx1"/>
+            </a:solidFill>
+          </a:ln>
+          <a:effectLst/>
+        </p:spPr>
+        <p:style>
+          <a:lnRef idx="2">
+            <a:schemeClr val="accent1"/>
+          </a:lnRef>
+          <a:fillRef idx="1">
+            <a:schemeClr val="lt1"/>
+          </a:fillRef>
+          <a:effectRef idx="0">
+            <a:schemeClr val="accent1"/>
+          </a:effectRef>
+          <a:fontRef idx="minor">
+            <a:schemeClr val="dk1"/>
+          </a:fontRef>
+        </p:style>
+        <p:txBody>
+          <a:bodyPr rtlCol="0" anchor="ctr"/>
+          <a:lstStyle/>
+          <a:p>
+            <a:pPr algn="ctr"/>
+            <a:r>
+              <a:rPr lang="pt-BR" sz="1400" dirty="0" smtClean="0"/>
+              <a:t>4</a:t>
+            </a:r>
+            <a:endParaRPr lang="pt-BR" sz="1400" dirty="0"/>
+          </a:p>
+        </p:txBody>
+      </p:sp>
+      <p:sp>
+        <p:nvSpPr>
+          <p:cNvPr id="14" name="Rectangle 13"/>
+          <p:cNvSpPr/>
+          <p:nvPr/>
+        </p:nvSpPr>
+        <p:spPr>
+          <a:xfrm>
+            <a:off x="6769107" y="1940699"/>
+            <a:ext cx="364065" cy="321733"/>
+          </a:xfrm>
+          <a:prstGeom prst="rect">
+            <a:avLst/>
+          </a:prstGeom>
+          <a:ln>
+            <a:solidFill>
+              <a:schemeClr val="tx1"/>
+            </a:solidFill>
+          </a:ln>
+          <a:effectLst/>
+        </p:spPr>
+        <p:style>
+          <a:lnRef idx="2">
+            <a:schemeClr val="accent1"/>
+          </a:lnRef>
+          <a:fillRef idx="1">
+            <a:schemeClr val="lt1"/>
+          </a:fillRef>
+          <a:effectRef idx="0">
+            <a:schemeClr val="accent1"/>
+          </a:effectRef>
+          <a:fontRef idx="minor">
+            <a:schemeClr val="dk1"/>
+          </a:fontRef>
+        </p:style>
+        <p:txBody>
+          <a:bodyPr rtlCol="0" anchor="ctr"/>
+          <a:lstStyle/>
+          <a:p>
+            <a:pPr algn="ctr"/>
+            <a:endParaRPr lang="pt-BR" sz="1400"/>
+          </a:p>
+        </p:txBody>
+      </p:sp>
+      <p:cxnSp>
+        <p:nvCxnSpPr>
+          <p:cNvPr id="15" name="Straight Connector 14"/>
+          <p:cNvCxnSpPr/>
+          <p:nvPr/>
+        </p:nvCxnSpPr>
+        <p:spPr>
+          <a:xfrm flipH="1">
+            <a:off x="6769107" y="1940699"/>
+            <a:ext cx="364065" cy="321733"/>
+          </a:xfrm>
+          <a:prstGeom prst="line">
+            <a:avLst/>
+          </a:prstGeom>
+          <a:ln>
+            <a:solidFill>
+              <a:schemeClr val="tx1"/>
+            </a:solidFill>
+          </a:ln>
+          <a:effectLst/>
+        </p:spPr>
+        <p:style>
+          <a:lnRef idx="2">
+            <a:schemeClr val="accent1"/>
+          </a:lnRef>
+          <a:fillRef idx="0">
+            <a:schemeClr val="accent1"/>
+          </a:fillRef>
+          <a:effectRef idx="1">
+            <a:schemeClr val="accent1"/>
+          </a:effectRef>
+          <a:fontRef idx="minor">
+            <a:schemeClr val="tx1"/>
+          </a:fontRef>
+        </p:style>
+      </p:cxnSp>
+      <p:cxnSp>
+        <p:nvCxnSpPr>
+          <p:cNvPr id="16" name="Straight Connector 15"/>
+          <p:cNvCxnSpPr/>
+          <p:nvPr/>
+        </p:nvCxnSpPr>
+        <p:spPr>
+          <a:xfrm>
+            <a:off x="6769107" y="1940699"/>
+            <a:ext cx="364065" cy="321733"/>
+          </a:xfrm>
+          <a:prstGeom prst="line">
+            <a:avLst/>
+          </a:prstGeom>
+          <a:ln>
+            <a:solidFill>
+              <a:schemeClr val="tx1"/>
+            </a:solidFill>
+          </a:ln>
+          <a:effectLst/>
+        </p:spPr>
+        <p:style>
+          <a:lnRef idx="2">
+            <a:schemeClr val="accent1"/>
+          </a:lnRef>
+          <a:fillRef idx="0">
+            <a:schemeClr val="accent1"/>
+          </a:fillRef>
+          <a:effectRef idx="1">
+            <a:schemeClr val="accent1"/>
+          </a:effectRef>
+          <a:fontRef idx="minor">
+            <a:schemeClr val="tx1"/>
+          </a:fontRef>
+        </p:style>
+      </p:cxnSp>
+      <p:cxnSp>
+        <p:nvCxnSpPr>
+          <p:cNvPr id="17" name="Straight Arrow Connector 16"/>
+          <p:cNvCxnSpPr>
+            <a:endCxn id="7" idx="1"/>
+          </p:cNvCxnSpPr>
+          <p:nvPr/>
+        </p:nvCxnSpPr>
+        <p:spPr>
+          <a:xfrm>
+            <a:off x="3678770" y="2101566"/>
+            <a:ext cx="546103" cy="0"/>
+          </a:xfrm>
+          <a:prstGeom prst="straightConnector1">
+            <a:avLst/>
+          </a:prstGeom>
+          <a:ln>
+            <a:solidFill>
+              <a:schemeClr val="tx1"/>
+            </a:solidFill>
+            <a:tailEnd type="arrow"/>
+          </a:ln>
+          <a:effectLst/>
+        </p:spPr>
+        <p:style>
+          <a:lnRef idx="2">
+            <a:schemeClr val="accent1"/>
+          </a:lnRef>
+          <a:fillRef idx="0">
+            <a:schemeClr val="accent1"/>
+          </a:fillRef>
+          <a:effectRef idx="1">
+            <a:schemeClr val="accent1"/>
+          </a:effectRef>
+          <a:fontRef idx="minor">
+            <a:schemeClr val="tx1"/>
+          </a:fontRef>
+        </p:style>
+      </p:cxnSp>
+      <p:cxnSp>
+        <p:nvCxnSpPr>
+          <p:cNvPr id="18" name="Straight Arrow Connector 17"/>
+          <p:cNvCxnSpPr/>
+          <p:nvPr/>
+        </p:nvCxnSpPr>
+        <p:spPr>
+          <a:xfrm>
+            <a:off x="4754037" y="2101566"/>
+            <a:ext cx="546103" cy="0"/>
+          </a:xfrm>
+          <a:prstGeom prst="straightConnector1">
+            <a:avLst/>
+          </a:prstGeom>
+          <a:ln>
+            <a:solidFill>
+              <a:schemeClr val="tx1"/>
+            </a:solidFill>
+            <a:tailEnd type="arrow"/>
+          </a:ln>
+          <a:effectLst/>
+        </p:spPr>
+        <p:style>
+          <a:lnRef idx="2">
+            <a:schemeClr val="accent1"/>
+          </a:lnRef>
+          <a:fillRef idx="0">
+            <a:schemeClr val="accent1"/>
+          </a:fillRef>
+          <a:effectRef idx="1">
+            <a:schemeClr val="accent1"/>
+          </a:effectRef>
+          <a:fontRef idx="minor">
+            <a:schemeClr val="tx1"/>
+          </a:fontRef>
+        </p:style>
+      </p:cxnSp>
+      <p:cxnSp>
+        <p:nvCxnSpPr>
+          <p:cNvPr id="19" name="Straight Arrow Connector 18"/>
+          <p:cNvCxnSpPr/>
+          <p:nvPr/>
+        </p:nvCxnSpPr>
+        <p:spPr>
+          <a:xfrm>
+            <a:off x="5837770" y="2101566"/>
+            <a:ext cx="546103" cy="0"/>
+          </a:xfrm>
+          <a:prstGeom prst="straightConnector1">
+            <a:avLst/>
+          </a:prstGeom>
+          <a:ln>
+            <a:solidFill>
+              <a:schemeClr val="tx1"/>
+            </a:solidFill>
+            <a:tailEnd type="arrow"/>
+          </a:ln>
+          <a:effectLst/>
+        </p:spPr>
+        <p:style>
+          <a:lnRef idx="2">
+            <a:schemeClr val="accent1"/>
+          </a:lnRef>
+          <a:fillRef idx="0">
+            <a:schemeClr val="accent1"/>
+          </a:fillRef>
+          <a:effectRef idx="1">
+            <a:schemeClr val="accent1"/>
+          </a:effectRef>
+          <a:fontRef idx="minor">
+            <a:schemeClr val="tx1"/>
+          </a:fontRef>
+        </p:style>
+      </p:cxnSp>
+      <p:sp>
+        <p:nvSpPr>
+          <p:cNvPr id="24" name="TextBox 23"/>
+          <p:cNvSpPr txBox="1"/>
+          <p:nvPr/>
+        </p:nvSpPr>
+        <p:spPr>
+          <a:xfrm>
+            <a:off x="1187357" y="1923765"/>
+            <a:ext cx="1353844" cy="307777"/>
+          </a:xfrm>
+          <a:prstGeom prst="rect">
+            <a:avLst/>
+          </a:prstGeom>
+          <a:solidFill>
+            <a:schemeClr val="bg1"/>
+          </a:solidFill>
+          <a:effectLst/>
+        </p:spPr>
+        <p:txBody>
+          <a:bodyPr wrap="none" rtlCol="0">
+            <a:spAutoFit/>
+          </a:bodyPr>
+          <a:lstStyle/>
+          <a:p>
+            <a:r>
+              <a:rPr lang="pt-BR" sz="1400" dirty="0" smtClean="0"/>
+              <a:t>Lista encadeada</a:t>
+            </a:r>
+            <a:endParaRPr lang="pt-BR" sz="1400" dirty="0"/>
+          </a:p>
+        </p:txBody>
+      </p:sp>
+      <p:cxnSp>
+        <p:nvCxnSpPr>
+          <p:cNvPr id="25" name="Straight Arrow Connector 24"/>
+          <p:cNvCxnSpPr>
+            <a:endCxn id="5" idx="1"/>
+          </p:cNvCxnSpPr>
+          <p:nvPr/>
+        </p:nvCxnSpPr>
+        <p:spPr>
+          <a:xfrm>
+            <a:off x="2564463" y="2101566"/>
+            <a:ext cx="576677" cy="0"/>
+          </a:xfrm>
+          <a:prstGeom prst="straightConnector1">
+            <a:avLst/>
+          </a:prstGeom>
+          <a:ln>
+            <a:solidFill>
+              <a:schemeClr val="tx1"/>
+            </a:solidFill>
+            <a:prstDash val="solid"/>
+            <a:tailEnd type="arrow"/>
+          </a:ln>
+          <a:effectLst/>
+        </p:spPr>
+        <p:style>
+          <a:lnRef idx="2">
+            <a:schemeClr val="accent1"/>
+          </a:lnRef>
+          <a:fillRef idx="0">
+            <a:schemeClr val="accent1"/>
+          </a:fillRef>
+          <a:effectRef idx="1">
+            <a:schemeClr val="accent1"/>
+          </a:effectRef>
+          <a:fontRef idx="minor">
+            <a:schemeClr val="tx1"/>
+          </a:fontRef>
+        </p:style>
+      </p:cxnSp>
+      <p:cxnSp>
+        <p:nvCxnSpPr>
+          <p:cNvPr id="26" name="Straight Connector 25"/>
+          <p:cNvCxnSpPr/>
+          <p:nvPr/>
+        </p:nvCxnSpPr>
+        <p:spPr>
+          <a:xfrm flipH="1">
+            <a:off x="4936075" y="2931299"/>
+            <a:ext cx="364065" cy="321733"/>
+          </a:xfrm>
+          <a:prstGeom prst="line">
+            <a:avLst/>
+          </a:prstGeom>
+          <a:ln>
+            <a:solidFill>
+              <a:schemeClr val="tx1"/>
+            </a:solidFill>
+          </a:ln>
+          <a:effectLst/>
+        </p:spPr>
+        <p:style>
+          <a:lnRef idx="2">
+            <a:schemeClr val="accent1"/>
+          </a:lnRef>
+          <a:fillRef idx="0">
+            <a:schemeClr val="accent1"/>
+          </a:fillRef>
+          <a:effectRef idx="1">
+            <a:schemeClr val="accent1"/>
+          </a:effectRef>
+          <a:fontRef idx="minor">
+            <a:schemeClr val="tx1"/>
+          </a:fontRef>
+        </p:style>
+      </p:cxnSp>
+      <p:cxnSp>
+        <p:nvCxnSpPr>
+          <p:cNvPr id="27" name="Straight Connector 26"/>
+          <p:cNvCxnSpPr/>
+          <p:nvPr/>
+        </p:nvCxnSpPr>
+        <p:spPr>
+          <a:xfrm>
+            <a:off x="4936075" y="2931299"/>
+            <a:ext cx="364065" cy="321733"/>
+          </a:xfrm>
+          <a:prstGeom prst="line">
+            <a:avLst/>
+          </a:prstGeom>
+          <a:ln>
+            <a:solidFill>
+              <a:schemeClr val="tx1"/>
+            </a:solidFill>
+          </a:ln>
+          <a:effectLst/>
+        </p:spPr>
+        <p:style>
+          <a:lnRef idx="2">
+            <a:schemeClr val="accent1"/>
+          </a:lnRef>
+          <a:fillRef idx="0">
+            <a:schemeClr val="accent1"/>
+          </a:fillRef>
+          <a:effectRef idx="1">
+            <a:schemeClr val="accent1"/>
+          </a:effectRef>
+          <a:fontRef idx="minor">
+            <a:schemeClr val="tx1"/>
+          </a:fontRef>
+        </p:style>
+      </p:cxnSp>
+      <p:sp>
+        <p:nvSpPr>
+          <p:cNvPr id="28" name="TextBox 27"/>
+          <p:cNvSpPr txBox="1"/>
+          <p:nvPr/>
+        </p:nvSpPr>
+        <p:spPr>
+          <a:xfrm>
+            <a:off x="3780375" y="2931299"/>
+            <a:ext cx="650163" cy="307777"/>
+          </a:xfrm>
+          <a:prstGeom prst="rect">
+            <a:avLst/>
+          </a:prstGeom>
+          <a:solidFill>
+            <a:schemeClr val="bg1"/>
+          </a:solidFill>
+          <a:effectLst/>
+        </p:spPr>
+        <p:txBody>
+          <a:bodyPr wrap="none" rtlCol="0">
+            <a:spAutoFit/>
+          </a:bodyPr>
+          <a:lstStyle/>
+          <a:p>
+            <a:r>
+              <a:rPr lang="pt-BR" sz="1400" dirty="0" smtClean="0"/>
+              <a:t>Inserir</a:t>
+            </a:r>
+            <a:endParaRPr lang="pt-BR" sz="1400" dirty="0"/>
+          </a:p>
+        </p:txBody>
+      </p:sp>
+      <p:sp>
+        <p:nvSpPr>
+          <p:cNvPr id="29" name="Rectangle 28"/>
+          <p:cNvSpPr/>
+          <p:nvPr/>
+        </p:nvSpPr>
+        <p:spPr>
+          <a:xfrm>
+            <a:off x="3814240" y="3883799"/>
+            <a:ext cx="364065" cy="321733"/>
+          </a:xfrm>
+          <a:prstGeom prst="rect">
+            <a:avLst/>
+          </a:prstGeom>
+          <a:ln>
+            <a:solidFill>
+              <a:schemeClr val="tx1"/>
+            </a:solidFill>
+          </a:ln>
+          <a:effectLst/>
+        </p:spPr>
+        <p:style>
+          <a:lnRef idx="2">
+            <a:schemeClr val="accent1"/>
+          </a:lnRef>
+          <a:fillRef idx="1">
+            <a:schemeClr val="lt1"/>
+          </a:fillRef>
+          <a:effectRef idx="0">
+            <a:schemeClr val="accent1"/>
+          </a:effectRef>
+          <a:fontRef idx="minor">
+            <a:schemeClr val="dk1"/>
+          </a:fontRef>
+        </p:style>
+        <p:txBody>
+          <a:bodyPr rtlCol="0" anchor="ctr"/>
+          <a:lstStyle/>
+          <a:p>
+            <a:pPr algn="ctr"/>
+            <a:r>
+              <a:rPr lang="pt-BR" sz="1400" dirty="0" smtClean="0"/>
+              <a:t>15</a:t>
+            </a:r>
+            <a:endParaRPr lang="pt-BR" sz="1400" dirty="0"/>
+          </a:p>
+        </p:txBody>
+      </p:sp>
+      <p:sp>
+        <p:nvSpPr>
+          <p:cNvPr id="30" name="Rectangle 29"/>
+          <p:cNvSpPr/>
+          <p:nvPr/>
+        </p:nvSpPr>
+        <p:spPr>
+          <a:xfrm>
+            <a:off x="4178305" y="3883799"/>
+            <a:ext cx="364065" cy="321733"/>
+          </a:xfrm>
+          <a:prstGeom prst="rect">
+            <a:avLst/>
+          </a:prstGeom>
+          <a:ln>
+            <a:solidFill>
+              <a:schemeClr val="tx1"/>
+            </a:solidFill>
+          </a:ln>
+          <a:effectLst/>
+        </p:spPr>
+        <p:style>
+          <a:lnRef idx="2">
+            <a:schemeClr val="accent1"/>
+          </a:lnRef>
+          <a:fillRef idx="1">
+            <a:schemeClr val="lt1"/>
+          </a:fillRef>
+          <a:effectRef idx="0">
+            <a:schemeClr val="accent1"/>
+          </a:effectRef>
+          <a:fontRef idx="minor">
+            <a:schemeClr val="dk1"/>
+          </a:fontRef>
+        </p:style>
+        <p:txBody>
+          <a:bodyPr rtlCol="0" anchor="ctr"/>
+          <a:lstStyle/>
+          <a:p>
+            <a:pPr algn="ctr"/>
+            <a:endParaRPr lang="pt-BR" sz="1400"/>
+          </a:p>
+        </p:txBody>
+      </p:sp>
+      <p:sp>
+        <p:nvSpPr>
+          <p:cNvPr id="31" name="Rectangle 30"/>
+          <p:cNvSpPr/>
+          <p:nvPr/>
+        </p:nvSpPr>
+        <p:spPr>
+          <a:xfrm>
+            <a:off x="4897973" y="3883799"/>
+            <a:ext cx="364065" cy="321733"/>
+          </a:xfrm>
+          <a:prstGeom prst="rect">
+            <a:avLst/>
+          </a:prstGeom>
+          <a:ln>
+            <a:solidFill>
+              <a:schemeClr val="tx1"/>
+            </a:solidFill>
+          </a:ln>
+          <a:effectLst/>
+        </p:spPr>
+        <p:style>
+          <a:lnRef idx="2">
+            <a:schemeClr val="accent1"/>
+          </a:lnRef>
+          <a:fillRef idx="1">
+            <a:schemeClr val="lt1"/>
+          </a:fillRef>
+          <a:effectRef idx="0">
+            <a:schemeClr val="accent1"/>
+          </a:effectRef>
+          <a:fontRef idx="minor">
+            <a:schemeClr val="dk1"/>
+          </a:fontRef>
+        </p:style>
+        <p:txBody>
+          <a:bodyPr rtlCol="0" anchor="ctr"/>
+          <a:lstStyle/>
+          <a:p>
+            <a:pPr algn="ctr"/>
+            <a:r>
+              <a:rPr lang="pt-BR" sz="1400" dirty="0" smtClean="0"/>
+              <a:t>30</a:t>
+            </a:r>
+            <a:endParaRPr lang="pt-BR" sz="1400" dirty="0"/>
+          </a:p>
+        </p:txBody>
+      </p:sp>
+      <p:sp>
+        <p:nvSpPr>
+          <p:cNvPr id="32" name="Rectangle 31"/>
+          <p:cNvSpPr/>
+          <p:nvPr/>
+        </p:nvSpPr>
+        <p:spPr>
+          <a:xfrm>
+            <a:off x="5262038" y="3883799"/>
+            <a:ext cx="364065" cy="321733"/>
+          </a:xfrm>
+          <a:prstGeom prst="rect">
+            <a:avLst/>
+          </a:prstGeom>
+          <a:ln>
+            <a:solidFill>
+              <a:schemeClr val="tx1"/>
+            </a:solidFill>
+          </a:ln>
+          <a:effectLst/>
+        </p:spPr>
+        <p:style>
+          <a:lnRef idx="2">
+            <a:schemeClr val="accent1"/>
+          </a:lnRef>
+          <a:fillRef idx="1">
+            <a:schemeClr val="lt1"/>
+          </a:fillRef>
+          <a:effectRef idx="0">
+            <a:schemeClr val="accent1"/>
+          </a:effectRef>
+          <a:fontRef idx="minor">
+            <a:schemeClr val="dk1"/>
+          </a:fontRef>
+        </p:style>
+        <p:txBody>
+          <a:bodyPr rtlCol="0" anchor="ctr"/>
+          <a:lstStyle/>
+          <a:p>
+            <a:pPr algn="ctr"/>
+            <a:endParaRPr lang="pt-BR" sz="1400"/>
+          </a:p>
+        </p:txBody>
+      </p:sp>
+      <p:sp>
+        <p:nvSpPr>
+          <p:cNvPr id="33" name="Rectangle 32"/>
+          <p:cNvSpPr/>
+          <p:nvPr/>
+        </p:nvSpPr>
+        <p:spPr>
+          <a:xfrm>
+            <a:off x="5973240" y="3883799"/>
+            <a:ext cx="364065" cy="321733"/>
+          </a:xfrm>
+          <a:prstGeom prst="rect">
+            <a:avLst/>
+          </a:prstGeom>
+          <a:ln>
+            <a:solidFill>
+              <a:schemeClr val="tx1"/>
+            </a:solidFill>
+          </a:ln>
+          <a:effectLst/>
+        </p:spPr>
+        <p:style>
+          <a:lnRef idx="2">
+            <a:schemeClr val="accent1"/>
+          </a:lnRef>
+          <a:fillRef idx="1">
+            <a:schemeClr val="lt1"/>
+          </a:fillRef>
+          <a:effectRef idx="0">
+            <a:schemeClr val="accent1"/>
+          </a:effectRef>
+          <a:fontRef idx="minor">
+            <a:schemeClr val="dk1"/>
+          </a:fontRef>
+        </p:style>
+        <p:txBody>
+          <a:bodyPr rtlCol="0" anchor="ctr"/>
+          <a:lstStyle/>
+          <a:p>
+            <a:pPr algn="ctr"/>
+            <a:r>
+              <a:rPr lang="pt-BR" sz="1400" dirty="0" smtClean="0"/>
+              <a:t>6</a:t>
+            </a:r>
+            <a:endParaRPr lang="pt-BR" sz="1400" dirty="0"/>
+          </a:p>
+        </p:txBody>
+      </p:sp>
+      <p:sp>
+        <p:nvSpPr>
+          <p:cNvPr id="34" name="Rectangle 33"/>
+          <p:cNvSpPr/>
+          <p:nvPr/>
+        </p:nvSpPr>
+        <p:spPr>
+          <a:xfrm>
+            <a:off x="6337305" y="3883799"/>
+            <a:ext cx="364065" cy="321733"/>
+          </a:xfrm>
+          <a:prstGeom prst="rect">
+            <a:avLst/>
+          </a:prstGeom>
+          <a:ln>
+            <a:solidFill>
+              <a:schemeClr val="tx1"/>
+            </a:solidFill>
+          </a:ln>
+          <a:effectLst/>
+        </p:spPr>
+        <p:style>
+          <a:lnRef idx="2">
+            <a:schemeClr val="accent1"/>
+          </a:lnRef>
+          <a:fillRef idx="1">
+            <a:schemeClr val="lt1"/>
+          </a:fillRef>
+          <a:effectRef idx="0">
+            <a:schemeClr val="accent1"/>
+          </a:effectRef>
+          <a:fontRef idx="minor">
+            <a:schemeClr val="dk1"/>
+          </a:fontRef>
+        </p:style>
+        <p:txBody>
+          <a:bodyPr rtlCol="0" anchor="ctr"/>
+          <a:lstStyle/>
+          <a:p>
+            <a:pPr algn="ctr"/>
+            <a:endParaRPr lang="pt-BR" sz="1400"/>
+          </a:p>
+        </p:txBody>
+      </p:sp>
+      <p:sp>
+        <p:nvSpPr>
+          <p:cNvPr id="35" name="Rectangle 34"/>
+          <p:cNvSpPr/>
+          <p:nvPr/>
+        </p:nvSpPr>
+        <p:spPr>
+          <a:xfrm>
+            <a:off x="3246983" y="4770398"/>
+            <a:ext cx="364065" cy="321733"/>
+          </a:xfrm>
+          <a:prstGeom prst="rect">
+            <a:avLst/>
+          </a:prstGeom>
+          <a:ln>
+            <a:solidFill>
+              <a:schemeClr val="tx1"/>
+            </a:solidFill>
+          </a:ln>
+          <a:effectLst/>
+        </p:spPr>
+        <p:style>
+          <a:lnRef idx="2">
+            <a:schemeClr val="accent1"/>
+          </a:lnRef>
+          <a:fillRef idx="1">
+            <a:schemeClr val="lt1"/>
+          </a:fillRef>
+          <a:effectRef idx="0">
+            <a:schemeClr val="accent1"/>
+          </a:effectRef>
+          <a:fontRef idx="minor">
+            <a:schemeClr val="dk1"/>
+          </a:fontRef>
+        </p:style>
+        <p:txBody>
+          <a:bodyPr rtlCol="0" anchor="ctr"/>
+          <a:lstStyle/>
+          <a:p>
+            <a:pPr algn="ctr"/>
+            <a:r>
+              <a:rPr lang="pt-BR" sz="1400" dirty="0" smtClean="0"/>
+              <a:t>7</a:t>
+            </a:r>
+            <a:endParaRPr lang="pt-BR" sz="1400" dirty="0"/>
+          </a:p>
+        </p:txBody>
+      </p:sp>
+      <p:sp>
+        <p:nvSpPr>
+          <p:cNvPr id="36" name="Rectangle 35"/>
+          <p:cNvSpPr/>
+          <p:nvPr/>
+        </p:nvSpPr>
+        <p:spPr>
+          <a:xfrm>
+            <a:off x="3611048" y="4770398"/>
+            <a:ext cx="364065" cy="321733"/>
+          </a:xfrm>
+          <a:prstGeom prst="rect">
+            <a:avLst/>
+          </a:prstGeom>
+          <a:ln>
+            <a:solidFill>
+              <a:schemeClr val="tx1"/>
+            </a:solidFill>
+          </a:ln>
+          <a:effectLst/>
+        </p:spPr>
+        <p:style>
+          <a:lnRef idx="2">
+            <a:schemeClr val="accent1"/>
+          </a:lnRef>
+          <a:fillRef idx="1">
+            <a:schemeClr val="lt1"/>
+          </a:fillRef>
+          <a:effectRef idx="0">
+            <a:schemeClr val="accent1"/>
+          </a:effectRef>
+          <a:fontRef idx="minor">
+            <a:schemeClr val="dk1"/>
+          </a:fontRef>
+        </p:style>
+        <p:txBody>
+          <a:bodyPr rtlCol="0" anchor="ctr"/>
+          <a:lstStyle/>
+          <a:p>
+            <a:pPr algn="ctr"/>
+            <a:endParaRPr lang="pt-BR" sz="1400"/>
+          </a:p>
+        </p:txBody>
+      </p:sp>
+      <p:sp>
+        <p:nvSpPr>
+          <p:cNvPr id="37" name="Rectangle 36"/>
+          <p:cNvSpPr/>
+          <p:nvPr/>
+        </p:nvSpPr>
+        <p:spPr>
+          <a:xfrm>
+            <a:off x="7052742" y="3883799"/>
+            <a:ext cx="364065" cy="321733"/>
+          </a:xfrm>
+          <a:prstGeom prst="rect">
+            <a:avLst/>
+          </a:prstGeom>
+          <a:ln>
+            <a:solidFill>
+              <a:schemeClr val="tx1"/>
+            </a:solidFill>
+          </a:ln>
+          <a:effectLst/>
+        </p:spPr>
+        <p:style>
+          <a:lnRef idx="2">
+            <a:schemeClr val="accent1"/>
+          </a:lnRef>
+          <a:fillRef idx="1">
+            <a:schemeClr val="lt1"/>
+          </a:fillRef>
+          <a:effectRef idx="0">
+            <a:schemeClr val="accent1"/>
+          </a:effectRef>
+          <a:fontRef idx="minor">
+            <a:schemeClr val="dk1"/>
+          </a:fontRef>
+        </p:style>
+        <p:txBody>
+          <a:bodyPr rtlCol="0" anchor="ctr"/>
+          <a:lstStyle/>
+          <a:p>
+            <a:pPr algn="ctr"/>
+            <a:r>
+              <a:rPr lang="pt-BR" sz="1400" dirty="0" smtClean="0"/>
+              <a:t>4</a:t>
+            </a:r>
+            <a:endParaRPr lang="pt-BR" sz="1400" dirty="0"/>
+          </a:p>
+        </p:txBody>
+      </p:sp>
+      <p:sp>
+        <p:nvSpPr>
+          <p:cNvPr id="38" name="Rectangle 37"/>
+          <p:cNvSpPr/>
+          <p:nvPr/>
+        </p:nvSpPr>
+        <p:spPr>
+          <a:xfrm>
+            <a:off x="7416807" y="3883799"/>
+            <a:ext cx="364065" cy="321733"/>
+          </a:xfrm>
+          <a:prstGeom prst="rect">
+            <a:avLst/>
+          </a:prstGeom>
+          <a:ln>
+            <a:solidFill>
+              <a:schemeClr val="tx1"/>
+            </a:solidFill>
+          </a:ln>
+          <a:effectLst/>
+        </p:spPr>
+        <p:style>
+          <a:lnRef idx="2">
+            <a:schemeClr val="accent1"/>
+          </a:lnRef>
+          <a:fillRef idx="1">
+            <a:schemeClr val="lt1"/>
+          </a:fillRef>
+          <a:effectRef idx="0">
+            <a:schemeClr val="accent1"/>
+          </a:effectRef>
+          <a:fontRef idx="minor">
+            <a:schemeClr val="dk1"/>
+          </a:fontRef>
+        </p:style>
+        <p:txBody>
+          <a:bodyPr rtlCol="0" anchor="ctr"/>
+          <a:lstStyle/>
+          <a:p>
+            <a:pPr algn="ctr"/>
+            <a:endParaRPr lang="pt-BR" sz="1400"/>
+          </a:p>
+        </p:txBody>
+      </p:sp>
+      <p:cxnSp>
+        <p:nvCxnSpPr>
+          <p:cNvPr id="39" name="Straight Connector 38"/>
+          <p:cNvCxnSpPr/>
+          <p:nvPr/>
+        </p:nvCxnSpPr>
+        <p:spPr>
+          <a:xfrm flipH="1">
+            <a:off x="7416807" y="3883799"/>
+            <a:ext cx="364065" cy="321733"/>
+          </a:xfrm>
+          <a:prstGeom prst="line">
+            <a:avLst/>
+          </a:prstGeom>
+          <a:ln>
+            <a:solidFill>
+              <a:schemeClr val="tx1"/>
+            </a:solidFill>
+          </a:ln>
+          <a:effectLst/>
+        </p:spPr>
+        <p:style>
+          <a:lnRef idx="2">
+            <a:schemeClr val="accent1"/>
+          </a:lnRef>
+          <a:fillRef idx="0">
+            <a:schemeClr val="accent1"/>
+          </a:fillRef>
+          <a:effectRef idx="1">
+            <a:schemeClr val="accent1"/>
+          </a:effectRef>
+          <a:fontRef idx="minor">
+            <a:schemeClr val="tx1"/>
+          </a:fontRef>
+        </p:style>
+      </p:cxnSp>
+      <p:cxnSp>
+        <p:nvCxnSpPr>
+          <p:cNvPr id="40" name="Straight Connector 39"/>
+          <p:cNvCxnSpPr/>
+          <p:nvPr/>
+        </p:nvCxnSpPr>
+        <p:spPr>
+          <a:xfrm>
+            <a:off x="7416807" y="3883799"/>
+            <a:ext cx="364065" cy="321733"/>
+          </a:xfrm>
+          <a:prstGeom prst="line">
+            <a:avLst/>
+          </a:prstGeom>
+          <a:ln>
+            <a:solidFill>
+              <a:schemeClr val="tx1"/>
+            </a:solidFill>
+          </a:ln>
+          <a:effectLst/>
+        </p:spPr>
+        <p:style>
+          <a:lnRef idx="2">
+            <a:schemeClr val="accent1"/>
+          </a:lnRef>
+          <a:fillRef idx="0">
+            <a:schemeClr val="accent1"/>
+          </a:fillRef>
+          <a:effectRef idx="1">
+            <a:schemeClr val="accent1"/>
+          </a:effectRef>
+          <a:fontRef idx="minor">
+            <a:schemeClr val="tx1"/>
+          </a:fontRef>
+        </p:style>
+      </p:cxnSp>
+      <p:cxnSp>
+        <p:nvCxnSpPr>
+          <p:cNvPr id="41" name="Straight Arrow Connector 40"/>
+          <p:cNvCxnSpPr>
+            <a:endCxn id="31" idx="1"/>
+          </p:cNvCxnSpPr>
+          <p:nvPr/>
+        </p:nvCxnSpPr>
+        <p:spPr>
+          <a:xfrm>
+            <a:off x="4351870" y="4044666"/>
+            <a:ext cx="546103" cy="0"/>
+          </a:xfrm>
+          <a:prstGeom prst="straightConnector1">
+            <a:avLst/>
+          </a:prstGeom>
+          <a:ln>
+            <a:solidFill>
+              <a:schemeClr val="tx1"/>
+            </a:solidFill>
+            <a:tailEnd type="arrow"/>
+          </a:ln>
+          <a:effectLst/>
+        </p:spPr>
+        <p:style>
+          <a:lnRef idx="2">
+            <a:schemeClr val="accent1"/>
+          </a:lnRef>
+          <a:fillRef idx="0">
+            <a:schemeClr val="accent1"/>
+          </a:fillRef>
+          <a:effectRef idx="1">
+            <a:schemeClr val="accent1"/>
+          </a:effectRef>
+          <a:fontRef idx="minor">
+            <a:schemeClr val="tx1"/>
+          </a:fontRef>
+        </p:style>
+      </p:cxnSp>
+      <p:cxnSp>
+        <p:nvCxnSpPr>
+          <p:cNvPr id="42" name="Straight Arrow Connector 41"/>
+          <p:cNvCxnSpPr/>
+          <p:nvPr/>
+        </p:nvCxnSpPr>
+        <p:spPr>
+          <a:xfrm>
+            <a:off x="5427137" y="4044666"/>
+            <a:ext cx="546103" cy="0"/>
+          </a:xfrm>
+          <a:prstGeom prst="straightConnector1">
+            <a:avLst/>
+          </a:prstGeom>
+          <a:ln>
+            <a:solidFill>
+              <a:schemeClr val="tx1"/>
+            </a:solidFill>
+            <a:tailEnd type="arrow"/>
+          </a:ln>
+          <a:effectLst/>
+        </p:spPr>
+        <p:style>
+          <a:lnRef idx="2">
+            <a:schemeClr val="accent1"/>
+          </a:lnRef>
+          <a:fillRef idx="0">
+            <a:schemeClr val="accent1"/>
+          </a:fillRef>
+          <a:effectRef idx="1">
+            <a:schemeClr val="accent1"/>
+          </a:effectRef>
+          <a:fontRef idx="minor">
+            <a:schemeClr val="tx1"/>
+          </a:fontRef>
+        </p:style>
+      </p:cxnSp>
+      <p:cxnSp>
+        <p:nvCxnSpPr>
+          <p:cNvPr id="43" name="Straight Arrow Connector 42"/>
+          <p:cNvCxnSpPr/>
+          <p:nvPr/>
+        </p:nvCxnSpPr>
+        <p:spPr>
+          <a:xfrm>
+            <a:off x="6510870" y="4044666"/>
+            <a:ext cx="546103" cy="0"/>
+          </a:xfrm>
+          <a:prstGeom prst="straightConnector1">
+            <a:avLst/>
+          </a:prstGeom>
+          <a:ln>
+            <a:solidFill>
+              <a:schemeClr val="tx1"/>
+            </a:solidFill>
+            <a:tailEnd type="arrow"/>
+          </a:ln>
+          <a:effectLst/>
+        </p:spPr>
+        <p:style>
+          <a:lnRef idx="2">
+            <a:schemeClr val="accent1"/>
+          </a:lnRef>
+          <a:fillRef idx="0">
+            <a:schemeClr val="accent1"/>
+          </a:fillRef>
+          <a:effectRef idx="1">
+            <a:schemeClr val="accent1"/>
+          </a:effectRef>
+          <a:fontRef idx="minor">
+            <a:schemeClr val="tx1"/>
+          </a:fontRef>
+        </p:style>
+      </p:cxnSp>
+      <p:sp>
+        <p:nvSpPr>
+          <p:cNvPr id="44" name="TextBox 43"/>
+          <p:cNvSpPr txBox="1"/>
+          <p:nvPr/>
+        </p:nvSpPr>
+        <p:spPr>
+          <a:xfrm>
+            <a:off x="1339757" y="3866865"/>
+            <a:ext cx="1353844" cy="307777"/>
+          </a:xfrm>
+          <a:prstGeom prst="rect">
+            <a:avLst/>
+          </a:prstGeom>
+          <a:solidFill>
+            <a:schemeClr val="bg1"/>
+          </a:solidFill>
+          <a:effectLst/>
+        </p:spPr>
+        <p:txBody>
+          <a:bodyPr wrap="none" rtlCol="0">
+            <a:spAutoFit/>
+          </a:bodyPr>
+          <a:lstStyle/>
+          <a:p>
+            <a:r>
+              <a:rPr lang="pt-BR" sz="1400" dirty="0" smtClean="0"/>
+              <a:t>Lista encadeada</a:t>
+            </a:r>
+            <a:endParaRPr lang="pt-BR" sz="1400" dirty="0"/>
+          </a:p>
+        </p:txBody>
+      </p:sp>
+      <p:cxnSp>
+        <p:nvCxnSpPr>
+          <p:cNvPr id="45" name="Straight Arrow Connector 44"/>
+          <p:cNvCxnSpPr/>
+          <p:nvPr/>
+        </p:nvCxnSpPr>
+        <p:spPr>
+          <a:xfrm>
+            <a:off x="2668201" y="4166864"/>
+            <a:ext cx="553382" cy="764401"/>
+          </a:xfrm>
+          <a:prstGeom prst="straightConnector1">
+            <a:avLst/>
+          </a:prstGeom>
+          <a:ln>
+            <a:solidFill>
+              <a:schemeClr val="tx1"/>
+            </a:solidFill>
+            <a:prstDash val="solid"/>
+            <a:tailEnd type="arrow"/>
+          </a:ln>
+          <a:effectLst/>
+        </p:spPr>
+        <p:style>
+          <a:lnRef idx="2">
+            <a:schemeClr val="accent1"/>
+          </a:lnRef>
+          <a:fillRef idx="0">
+            <a:schemeClr val="accent1"/>
+          </a:fillRef>
+          <a:effectRef idx="1">
+            <a:schemeClr val="accent1"/>
+          </a:effectRef>
+          <a:fontRef idx="minor">
+            <a:schemeClr val="tx1"/>
+          </a:fontRef>
+        </p:style>
+      </p:cxnSp>
+      <p:cxnSp>
+        <p:nvCxnSpPr>
+          <p:cNvPr id="50" name="Straight Arrow Connector 49"/>
+          <p:cNvCxnSpPr>
+            <a:endCxn id="29" idx="2"/>
+          </p:cNvCxnSpPr>
+          <p:nvPr/>
+        </p:nvCxnSpPr>
+        <p:spPr>
+          <a:xfrm flipV="1">
+            <a:off x="3814240" y="4205532"/>
+            <a:ext cx="182033" cy="722068"/>
+          </a:xfrm>
+          <a:prstGeom prst="straightConnector1">
+            <a:avLst/>
+          </a:prstGeom>
+          <a:ln>
+            <a:solidFill>
+              <a:schemeClr val="tx1"/>
+            </a:solidFill>
+            <a:tailEnd type="arrow"/>
+          </a:ln>
+          <a:effectLst/>
+        </p:spPr>
+        <p:style>
+          <a:lnRef idx="2">
+            <a:schemeClr val="accent1"/>
+          </a:lnRef>
+          <a:fillRef idx="0">
+            <a:schemeClr val="accent1"/>
+          </a:fillRef>
+          <a:effectRef idx="1">
+            <a:schemeClr val="accent1"/>
+          </a:effectRef>
+          <a:fontRef idx="minor">
+            <a:schemeClr val="tx1"/>
+          </a:fontRef>
+        </p:style>
+      </p:cxnSp>
+    </p:spTree>
+    <p:extLst>
+      <p:ext uri="{BB962C8B-B14F-4D97-AF65-F5344CB8AC3E}">
+        <p14:creationId xmlns:p14="http://schemas.microsoft.com/office/powerpoint/2010/main" val="535338599"/>
+      </p:ext>
+    </p:extLst>
+  </p:cSld>
+  <p:clrMapOvr>
+    <a:masterClrMapping/>
+  </p:clrMapOvr>
+</p:sld>
+</file>
+
+<file path=ppt/slides/slide6.xml><?xml version="1.0" encoding="utf-8"?>
+<p:sld xmlns:a="http://schemas.openxmlformats.org/drawingml/2006/main" xmlns:r="http://schemas.openxmlformats.org/officeDocument/2006/relationships" xmlns:p="http://schemas.openxmlformats.org/presentationml/2006/main">
+  <p:cSld>
+    <p:spTree>
+      <p:nvGrpSpPr>
+        <p:cNvPr id="1" name=""/>
+        <p:cNvGrpSpPr/>
+        <p:nvPr/>
+      </p:nvGrpSpPr>
+      <p:grpSpPr>
+        <a:xfrm>
+          <a:off x="0" y="0"/>
+          <a:ext cx="0" cy="0"/>
+          <a:chOff x="0" y="0"/>
+          <a:chExt cx="0" cy="0"/>
+        </a:xfrm>
+      </p:grpSpPr>
+      <p:sp>
+        <p:nvSpPr>
+          <p:cNvPr id="4" name="Rectangle 3"/>
+          <p:cNvSpPr/>
+          <p:nvPr/>
+        </p:nvSpPr>
+        <p:spPr>
+          <a:xfrm>
+            <a:off x="3141140" y="1940699"/>
+            <a:ext cx="364065" cy="321733"/>
+          </a:xfrm>
+          <a:prstGeom prst="rect">
+            <a:avLst/>
+          </a:prstGeom>
+          <a:ln>
+            <a:solidFill>
+              <a:schemeClr val="tx1"/>
+            </a:solidFill>
+          </a:ln>
+          <a:effectLst/>
+        </p:spPr>
+        <p:style>
+          <a:lnRef idx="2">
+            <a:schemeClr val="accent1"/>
+          </a:lnRef>
+          <a:fillRef idx="1">
+            <a:schemeClr val="lt1"/>
+          </a:fillRef>
+          <a:effectRef idx="0">
+            <a:schemeClr val="accent1"/>
+          </a:effectRef>
+          <a:fontRef idx="minor">
+            <a:schemeClr val="dk1"/>
+          </a:fontRef>
+        </p:style>
+        <p:txBody>
+          <a:bodyPr rtlCol="0" anchor="ctr"/>
+          <a:lstStyle/>
+          <a:p>
+            <a:pPr algn="ctr"/>
+            <a:r>
+              <a:rPr lang="pl-PL" sz="1400" noProof="1" smtClean="0"/>
+              <a:t>15</a:t>
+            </a:r>
+            <a:endParaRPr lang="pl-PL" sz="1400" noProof="1"/>
+          </a:p>
+        </p:txBody>
+      </p:sp>
+      <p:sp>
+        <p:nvSpPr>
+          <p:cNvPr id="5" name="Rectangle 4"/>
+          <p:cNvSpPr/>
+          <p:nvPr/>
+        </p:nvSpPr>
+        <p:spPr>
+          <a:xfrm>
+            <a:off x="3505205" y="1940699"/>
+            <a:ext cx="364065" cy="321733"/>
+          </a:xfrm>
+          <a:prstGeom prst="rect">
+            <a:avLst/>
+          </a:prstGeom>
+          <a:ln>
+            <a:solidFill>
+              <a:schemeClr val="tx1"/>
+            </a:solidFill>
+          </a:ln>
+          <a:effectLst/>
+        </p:spPr>
+        <p:style>
+          <a:lnRef idx="2">
+            <a:schemeClr val="accent1"/>
+          </a:lnRef>
+          <a:fillRef idx="1">
+            <a:schemeClr val="lt1"/>
+          </a:fillRef>
+          <a:effectRef idx="0">
+            <a:schemeClr val="accent1"/>
+          </a:effectRef>
+          <a:fontRef idx="minor">
+            <a:schemeClr val="dk1"/>
+          </a:fontRef>
+        </p:style>
+        <p:txBody>
+          <a:bodyPr rtlCol="0" anchor="ctr"/>
+          <a:lstStyle/>
+          <a:p>
+            <a:pPr algn="ctr"/>
+            <a:endParaRPr lang="pl-PL" sz="1400" noProof="1"/>
+          </a:p>
+        </p:txBody>
+      </p:sp>
+      <p:sp>
+        <p:nvSpPr>
+          <p:cNvPr id="6" name="Rectangle 5"/>
+          <p:cNvSpPr/>
+          <p:nvPr/>
+        </p:nvSpPr>
+        <p:spPr>
+          <a:xfrm>
+            <a:off x="4224873" y="1940699"/>
+            <a:ext cx="364065" cy="321733"/>
+          </a:xfrm>
+          <a:prstGeom prst="rect">
+            <a:avLst/>
+          </a:prstGeom>
+          <a:ln>
+            <a:solidFill>
+              <a:schemeClr val="tx1"/>
+            </a:solidFill>
+          </a:ln>
+          <a:effectLst/>
+        </p:spPr>
+        <p:style>
+          <a:lnRef idx="2">
+            <a:schemeClr val="accent1"/>
+          </a:lnRef>
+          <a:fillRef idx="1">
+            <a:schemeClr val="lt1"/>
+          </a:fillRef>
+          <a:effectRef idx="0">
+            <a:schemeClr val="accent1"/>
+          </a:effectRef>
+          <a:fontRef idx="minor">
+            <a:schemeClr val="dk1"/>
+          </a:fontRef>
+        </p:style>
+        <p:txBody>
+          <a:bodyPr rtlCol="0" anchor="ctr"/>
+          <a:lstStyle/>
+          <a:p>
+            <a:pPr algn="ctr"/>
+            <a:r>
+              <a:rPr lang="pl-PL" sz="1400" noProof="1" smtClean="0"/>
+              <a:t>30</a:t>
+            </a:r>
+            <a:endParaRPr lang="pl-PL" sz="1400" noProof="1"/>
+          </a:p>
+        </p:txBody>
+      </p:sp>
+      <p:sp>
+        <p:nvSpPr>
+          <p:cNvPr id="7" name="Rectangle 6"/>
+          <p:cNvSpPr/>
+          <p:nvPr/>
+        </p:nvSpPr>
+        <p:spPr>
+          <a:xfrm>
+            <a:off x="4588938" y="1940699"/>
+            <a:ext cx="364065" cy="321733"/>
+          </a:xfrm>
+          <a:prstGeom prst="rect">
+            <a:avLst/>
+          </a:prstGeom>
+          <a:ln>
+            <a:solidFill>
+              <a:schemeClr val="tx1"/>
+            </a:solidFill>
+          </a:ln>
+          <a:effectLst/>
+        </p:spPr>
+        <p:style>
+          <a:lnRef idx="2">
+            <a:schemeClr val="accent1"/>
+          </a:lnRef>
+          <a:fillRef idx="1">
+            <a:schemeClr val="lt1"/>
+          </a:fillRef>
+          <a:effectRef idx="0">
+            <a:schemeClr val="accent1"/>
+          </a:effectRef>
+          <a:fontRef idx="minor">
+            <a:schemeClr val="dk1"/>
+          </a:fontRef>
+        </p:style>
+        <p:txBody>
+          <a:bodyPr rtlCol="0" anchor="ctr"/>
+          <a:lstStyle/>
+          <a:p>
+            <a:pPr algn="ctr"/>
+            <a:endParaRPr lang="pl-PL" sz="1400" noProof="1"/>
+          </a:p>
+        </p:txBody>
+      </p:sp>
+      <p:sp>
+        <p:nvSpPr>
+          <p:cNvPr id="8" name="Rectangle 7"/>
+          <p:cNvSpPr/>
+          <p:nvPr/>
+        </p:nvSpPr>
+        <p:spPr>
+          <a:xfrm>
+            <a:off x="5300140" y="1940699"/>
+            <a:ext cx="364065" cy="321733"/>
+          </a:xfrm>
+          <a:prstGeom prst="rect">
+            <a:avLst/>
+          </a:prstGeom>
+          <a:ln>
+            <a:solidFill>
+              <a:schemeClr val="tx1"/>
+            </a:solidFill>
+          </a:ln>
+          <a:effectLst/>
+        </p:spPr>
+        <p:style>
+          <a:lnRef idx="2">
+            <a:schemeClr val="accent1"/>
+          </a:lnRef>
+          <a:fillRef idx="1">
+            <a:schemeClr val="lt1"/>
+          </a:fillRef>
+          <a:effectRef idx="0">
+            <a:schemeClr val="accent1"/>
+          </a:effectRef>
+          <a:fontRef idx="minor">
+            <a:schemeClr val="dk1"/>
+          </a:fontRef>
+        </p:style>
+        <p:txBody>
+          <a:bodyPr rtlCol="0" anchor="ctr"/>
+          <a:lstStyle/>
+          <a:p>
+            <a:pPr algn="ctr"/>
+            <a:r>
+              <a:rPr lang="pl-PL" sz="1400" noProof="1" smtClean="0"/>
+              <a:t>6</a:t>
+            </a:r>
+            <a:endParaRPr lang="pl-PL" sz="1400" noProof="1"/>
+          </a:p>
+        </p:txBody>
+      </p:sp>
+      <p:sp>
+        <p:nvSpPr>
+          <p:cNvPr id="9" name="Rectangle 8"/>
+          <p:cNvSpPr/>
+          <p:nvPr/>
+        </p:nvSpPr>
+        <p:spPr>
+          <a:xfrm>
+            <a:off x="5664205" y="1940699"/>
+            <a:ext cx="364065" cy="321733"/>
+          </a:xfrm>
+          <a:prstGeom prst="rect">
+            <a:avLst/>
+          </a:prstGeom>
+          <a:ln>
+            <a:solidFill>
+              <a:schemeClr val="tx1"/>
+            </a:solidFill>
+          </a:ln>
+          <a:effectLst/>
+        </p:spPr>
+        <p:style>
+          <a:lnRef idx="2">
+            <a:schemeClr val="accent1"/>
+          </a:lnRef>
+          <a:fillRef idx="1">
+            <a:schemeClr val="lt1"/>
+          </a:fillRef>
+          <a:effectRef idx="0">
+            <a:schemeClr val="accent1"/>
+          </a:effectRef>
+          <a:fontRef idx="minor">
+            <a:schemeClr val="dk1"/>
+          </a:fontRef>
+        </p:style>
+        <p:txBody>
+          <a:bodyPr rtlCol="0" anchor="ctr"/>
+          <a:lstStyle/>
+          <a:p>
+            <a:pPr algn="ctr"/>
+            <a:endParaRPr lang="pl-PL" sz="1400" noProof="1"/>
+          </a:p>
+        </p:txBody>
+      </p:sp>
+      <p:sp>
+        <p:nvSpPr>
+          <p:cNvPr id="10" name="Rectangle 9"/>
+          <p:cNvSpPr/>
+          <p:nvPr/>
+        </p:nvSpPr>
+        <p:spPr>
+          <a:xfrm>
+            <a:off x="4572010" y="2931299"/>
+            <a:ext cx="364065" cy="321733"/>
+          </a:xfrm>
+          <a:prstGeom prst="rect">
+            <a:avLst/>
+          </a:prstGeom>
+          <a:ln>
+            <a:solidFill>
+              <a:schemeClr val="tx1"/>
+            </a:solidFill>
+          </a:ln>
+          <a:effectLst/>
+        </p:spPr>
+        <p:style>
+          <a:lnRef idx="2">
+            <a:schemeClr val="accent1"/>
+          </a:lnRef>
+          <a:fillRef idx="1">
+            <a:schemeClr val="lt1"/>
+          </a:fillRef>
+          <a:effectRef idx="0">
+            <a:schemeClr val="accent1"/>
+          </a:effectRef>
+          <a:fontRef idx="minor">
+            <a:schemeClr val="dk1"/>
+          </a:fontRef>
+        </p:style>
+        <p:txBody>
+          <a:bodyPr rtlCol="0" anchor="ctr"/>
+          <a:lstStyle/>
+          <a:p>
+            <a:pPr algn="ctr"/>
+            <a:r>
+              <a:rPr lang="pl-PL" sz="1400" noProof="1" smtClean="0"/>
+              <a:t>7</a:t>
+            </a:r>
+            <a:endParaRPr lang="pl-PL" sz="1400" noProof="1"/>
+          </a:p>
+        </p:txBody>
+      </p:sp>
+      <p:sp>
+        <p:nvSpPr>
+          <p:cNvPr id="11" name="Rectangle 10"/>
+          <p:cNvSpPr/>
+          <p:nvPr/>
+        </p:nvSpPr>
+        <p:spPr>
+          <a:xfrm>
+            <a:off x="4936075" y="2931299"/>
+            <a:ext cx="364065" cy="321733"/>
+          </a:xfrm>
+          <a:prstGeom prst="rect">
+            <a:avLst/>
+          </a:prstGeom>
+          <a:ln>
+            <a:solidFill>
+              <a:schemeClr val="tx1"/>
+            </a:solidFill>
+          </a:ln>
+          <a:effectLst/>
+        </p:spPr>
+        <p:style>
+          <a:lnRef idx="2">
+            <a:schemeClr val="accent1"/>
+          </a:lnRef>
+          <a:fillRef idx="1">
+            <a:schemeClr val="lt1"/>
+          </a:fillRef>
+          <a:effectRef idx="0">
+            <a:schemeClr val="accent1"/>
+          </a:effectRef>
+          <a:fontRef idx="minor">
+            <a:schemeClr val="dk1"/>
+          </a:fontRef>
+        </p:style>
+        <p:txBody>
+          <a:bodyPr rtlCol="0" anchor="ctr"/>
+          <a:lstStyle/>
+          <a:p>
+            <a:pPr algn="ctr"/>
+            <a:endParaRPr lang="pl-PL" sz="1400" noProof="1"/>
+          </a:p>
+        </p:txBody>
+      </p:sp>
+      <p:sp>
+        <p:nvSpPr>
+          <p:cNvPr id="12" name="Rectangle 11"/>
+          <p:cNvSpPr/>
+          <p:nvPr/>
+        </p:nvSpPr>
+        <p:spPr>
+          <a:xfrm>
+            <a:off x="6405042" y="1940699"/>
+            <a:ext cx="364065" cy="321733"/>
+          </a:xfrm>
+          <a:prstGeom prst="rect">
+            <a:avLst/>
+          </a:prstGeom>
+          <a:ln>
+            <a:solidFill>
+              <a:schemeClr val="tx1"/>
+            </a:solidFill>
+          </a:ln>
+          <a:effectLst/>
+        </p:spPr>
+        <p:style>
+          <a:lnRef idx="2">
+            <a:schemeClr val="accent1"/>
+          </a:lnRef>
+          <a:fillRef idx="1">
+            <a:schemeClr val="lt1"/>
+          </a:fillRef>
+          <a:effectRef idx="0">
+            <a:schemeClr val="accent1"/>
+          </a:effectRef>
+          <a:fontRef idx="minor">
+            <a:schemeClr val="dk1"/>
+          </a:fontRef>
+        </p:style>
+        <p:txBody>
+          <a:bodyPr rtlCol="0" anchor="ctr"/>
+          <a:lstStyle/>
+          <a:p>
+            <a:pPr algn="ctr"/>
+            <a:r>
+              <a:rPr lang="pl-PL" sz="1400" noProof="1" smtClean="0"/>
+              <a:t>4</a:t>
+            </a:r>
+            <a:endParaRPr lang="pl-PL" sz="1400" noProof="1"/>
+          </a:p>
+        </p:txBody>
+      </p:sp>
+      <p:sp>
+        <p:nvSpPr>
+          <p:cNvPr id="13" name="Rectangle 12"/>
+          <p:cNvSpPr/>
+          <p:nvPr/>
+        </p:nvSpPr>
+        <p:spPr>
+          <a:xfrm>
+            <a:off x="6769107" y="1940699"/>
+            <a:ext cx="364065" cy="321733"/>
+          </a:xfrm>
+          <a:prstGeom prst="rect">
+            <a:avLst/>
+          </a:prstGeom>
+          <a:ln>
+            <a:solidFill>
+              <a:schemeClr val="tx1"/>
+            </a:solidFill>
+          </a:ln>
+          <a:effectLst/>
+        </p:spPr>
+        <p:style>
+          <a:lnRef idx="2">
+            <a:schemeClr val="accent1"/>
+          </a:lnRef>
+          <a:fillRef idx="1">
+            <a:schemeClr val="lt1"/>
+          </a:fillRef>
+          <a:effectRef idx="0">
+            <a:schemeClr val="accent1"/>
+          </a:effectRef>
+          <a:fontRef idx="minor">
+            <a:schemeClr val="dk1"/>
+          </a:fontRef>
+        </p:style>
+        <p:txBody>
+          <a:bodyPr rtlCol="0" anchor="ctr"/>
+          <a:lstStyle/>
+          <a:p>
+            <a:pPr algn="ctr"/>
+            <a:endParaRPr lang="pl-PL" sz="1400" noProof="1"/>
+          </a:p>
+        </p:txBody>
+      </p:sp>
+      <p:cxnSp>
+        <p:nvCxnSpPr>
+          <p:cNvPr id="14" name="Straight Connector 13"/>
+          <p:cNvCxnSpPr/>
+          <p:nvPr/>
+        </p:nvCxnSpPr>
+        <p:spPr>
+          <a:xfrm flipH="1">
+            <a:off x="6769107" y="1940699"/>
+            <a:ext cx="364065" cy="321733"/>
+          </a:xfrm>
+          <a:prstGeom prst="line">
+            <a:avLst/>
+          </a:prstGeom>
+          <a:ln>
+            <a:solidFill>
+              <a:schemeClr val="tx1"/>
+            </a:solidFill>
+          </a:ln>
+          <a:effectLst/>
+        </p:spPr>
+        <p:style>
+          <a:lnRef idx="2">
+            <a:schemeClr val="accent1"/>
+          </a:lnRef>
+          <a:fillRef idx="0">
+            <a:schemeClr val="accent1"/>
+          </a:fillRef>
+          <a:effectRef idx="1">
+            <a:schemeClr val="accent1"/>
+          </a:effectRef>
+          <a:fontRef idx="minor">
+            <a:schemeClr val="tx1"/>
+          </a:fontRef>
+        </p:style>
+      </p:cxnSp>
+      <p:cxnSp>
+        <p:nvCxnSpPr>
+          <p:cNvPr id="15" name="Straight Connector 14"/>
+          <p:cNvCxnSpPr/>
+          <p:nvPr/>
+        </p:nvCxnSpPr>
+        <p:spPr>
+          <a:xfrm>
+            <a:off x="6769107" y="1940699"/>
+            <a:ext cx="364065" cy="321733"/>
+          </a:xfrm>
+          <a:prstGeom prst="line">
+            <a:avLst/>
+          </a:prstGeom>
+          <a:ln>
+            <a:solidFill>
+              <a:schemeClr val="tx1"/>
+            </a:solidFill>
+          </a:ln>
+          <a:effectLst/>
+        </p:spPr>
+        <p:style>
+          <a:lnRef idx="2">
+            <a:schemeClr val="accent1"/>
+          </a:lnRef>
+          <a:fillRef idx="0">
+            <a:schemeClr val="accent1"/>
+          </a:fillRef>
+          <a:effectRef idx="1">
+            <a:schemeClr val="accent1"/>
+          </a:effectRef>
+          <a:fontRef idx="minor">
+            <a:schemeClr val="tx1"/>
+          </a:fontRef>
+        </p:style>
+      </p:cxnSp>
+      <p:cxnSp>
+        <p:nvCxnSpPr>
+          <p:cNvPr id="16" name="Straight Arrow Connector 15"/>
+          <p:cNvCxnSpPr>
+            <a:endCxn id="6" idx="1"/>
+          </p:cNvCxnSpPr>
+          <p:nvPr/>
+        </p:nvCxnSpPr>
+        <p:spPr>
+          <a:xfrm>
+            <a:off x="3678770" y="2101566"/>
+            <a:ext cx="546103" cy="0"/>
+          </a:xfrm>
+          <a:prstGeom prst="straightConnector1">
+            <a:avLst/>
+          </a:prstGeom>
+          <a:ln>
+            <a:solidFill>
+              <a:schemeClr val="tx1"/>
+            </a:solidFill>
+            <a:tailEnd type="arrow"/>
+          </a:ln>
+          <a:effectLst/>
+        </p:spPr>
+        <p:style>
+          <a:lnRef idx="2">
+            <a:schemeClr val="accent1"/>
+          </a:lnRef>
+          <a:fillRef idx="0">
+            <a:schemeClr val="accent1"/>
+          </a:fillRef>
+          <a:effectRef idx="1">
+            <a:schemeClr val="accent1"/>
+          </a:effectRef>
+          <a:fontRef idx="minor">
+            <a:schemeClr val="tx1"/>
+          </a:fontRef>
+        </p:style>
+      </p:cxnSp>
+      <p:cxnSp>
+        <p:nvCxnSpPr>
+          <p:cNvPr id="17" name="Straight Arrow Connector 16"/>
+          <p:cNvCxnSpPr/>
+          <p:nvPr/>
+        </p:nvCxnSpPr>
+        <p:spPr>
+          <a:xfrm>
+            <a:off x="4754037" y="2101566"/>
+            <a:ext cx="546103" cy="0"/>
+          </a:xfrm>
+          <a:prstGeom prst="straightConnector1">
+            <a:avLst/>
+          </a:prstGeom>
+          <a:ln>
+            <a:solidFill>
+              <a:schemeClr val="tx1"/>
+            </a:solidFill>
+            <a:tailEnd type="arrow"/>
+          </a:ln>
+          <a:effectLst/>
+        </p:spPr>
+        <p:style>
+          <a:lnRef idx="2">
+            <a:schemeClr val="accent1"/>
+          </a:lnRef>
+          <a:fillRef idx="0">
+            <a:schemeClr val="accent1"/>
+          </a:fillRef>
+          <a:effectRef idx="1">
+            <a:schemeClr val="accent1"/>
+          </a:effectRef>
+          <a:fontRef idx="minor">
+            <a:schemeClr val="tx1"/>
+          </a:fontRef>
+        </p:style>
+      </p:cxnSp>
+      <p:cxnSp>
+        <p:nvCxnSpPr>
+          <p:cNvPr id="18" name="Straight Arrow Connector 17"/>
+          <p:cNvCxnSpPr/>
+          <p:nvPr/>
+        </p:nvCxnSpPr>
+        <p:spPr>
+          <a:xfrm>
+            <a:off x="5837770" y="2101566"/>
+            <a:ext cx="546103" cy="0"/>
+          </a:xfrm>
+          <a:prstGeom prst="straightConnector1">
+            <a:avLst/>
+          </a:prstGeom>
+          <a:ln>
+            <a:solidFill>
+              <a:schemeClr val="tx1"/>
+            </a:solidFill>
+            <a:tailEnd type="arrow"/>
+          </a:ln>
+          <a:effectLst/>
+        </p:spPr>
+        <p:style>
+          <a:lnRef idx="2">
+            <a:schemeClr val="accent1"/>
+          </a:lnRef>
+          <a:fillRef idx="0">
+            <a:schemeClr val="accent1"/>
+          </a:fillRef>
+          <a:effectRef idx="1">
+            <a:schemeClr val="accent1"/>
+          </a:effectRef>
+          <a:fontRef idx="minor">
+            <a:schemeClr val="tx1"/>
+          </a:fontRef>
+        </p:style>
+      </p:cxnSp>
+      <p:sp>
+        <p:nvSpPr>
+          <p:cNvPr id="19" name="TextBox 18"/>
+          <p:cNvSpPr txBox="1"/>
+          <p:nvPr/>
+        </p:nvSpPr>
+        <p:spPr>
+          <a:xfrm>
+            <a:off x="1187357" y="1923765"/>
+            <a:ext cx="1353844" cy="307777"/>
+          </a:xfrm>
+          <a:prstGeom prst="rect">
+            <a:avLst/>
+          </a:prstGeom>
+          <a:solidFill>
+            <a:schemeClr val="bg1"/>
+          </a:solidFill>
+          <a:effectLst/>
+        </p:spPr>
+        <p:txBody>
+          <a:bodyPr wrap="none" rtlCol="0">
+            <a:spAutoFit/>
+          </a:bodyPr>
+          <a:lstStyle/>
+          <a:p>
+            <a:r>
+              <a:rPr lang="pl-PL" sz="1400" noProof="1" smtClean="0"/>
+              <a:t>Lista encadeada</a:t>
+            </a:r>
+            <a:endParaRPr lang="pl-PL" sz="1400" noProof="1"/>
+          </a:p>
+        </p:txBody>
+      </p:sp>
+      <p:cxnSp>
+        <p:nvCxnSpPr>
+          <p:cNvPr id="20" name="Straight Arrow Connector 19"/>
+          <p:cNvCxnSpPr>
+            <a:endCxn id="4" idx="1"/>
+          </p:cNvCxnSpPr>
+          <p:nvPr/>
+        </p:nvCxnSpPr>
+        <p:spPr>
+          <a:xfrm>
+            <a:off x="2564463" y="2101566"/>
+            <a:ext cx="576677" cy="0"/>
+          </a:xfrm>
+          <a:prstGeom prst="straightConnector1">
+            <a:avLst/>
+          </a:prstGeom>
+          <a:ln>
+            <a:solidFill>
+              <a:schemeClr val="tx1"/>
+            </a:solidFill>
+            <a:prstDash val="solid"/>
+            <a:tailEnd type="arrow"/>
+          </a:ln>
+          <a:effectLst/>
+        </p:spPr>
+        <p:style>
+          <a:lnRef idx="2">
+            <a:schemeClr val="accent1"/>
+          </a:lnRef>
+          <a:fillRef idx="0">
+            <a:schemeClr val="accent1"/>
+          </a:fillRef>
+          <a:effectRef idx="1">
+            <a:schemeClr val="accent1"/>
+          </a:effectRef>
+          <a:fontRef idx="minor">
+            <a:schemeClr val="tx1"/>
+          </a:fontRef>
+        </p:style>
+      </p:cxnSp>
+      <p:cxnSp>
+        <p:nvCxnSpPr>
+          <p:cNvPr id="21" name="Straight Connector 20"/>
+          <p:cNvCxnSpPr/>
+          <p:nvPr/>
+        </p:nvCxnSpPr>
+        <p:spPr>
+          <a:xfrm flipH="1">
+            <a:off x="4936075" y="2931299"/>
+            <a:ext cx="364065" cy="321733"/>
+          </a:xfrm>
+          <a:prstGeom prst="line">
+            <a:avLst/>
+          </a:prstGeom>
+          <a:ln>
+            <a:solidFill>
+              <a:schemeClr val="tx1"/>
+            </a:solidFill>
+          </a:ln>
+          <a:effectLst/>
+        </p:spPr>
+        <p:style>
+          <a:lnRef idx="2">
+            <a:schemeClr val="accent1"/>
+          </a:lnRef>
+          <a:fillRef idx="0">
+            <a:schemeClr val="accent1"/>
+          </a:fillRef>
+          <a:effectRef idx="1">
+            <a:schemeClr val="accent1"/>
+          </a:effectRef>
+          <a:fontRef idx="minor">
+            <a:schemeClr val="tx1"/>
+          </a:fontRef>
+        </p:style>
+      </p:cxnSp>
+      <p:cxnSp>
+        <p:nvCxnSpPr>
+          <p:cNvPr id="22" name="Straight Connector 21"/>
+          <p:cNvCxnSpPr/>
+          <p:nvPr/>
+        </p:nvCxnSpPr>
+        <p:spPr>
+          <a:xfrm>
+            <a:off x="4936075" y="2931299"/>
+            <a:ext cx="364065" cy="321733"/>
+          </a:xfrm>
+          <a:prstGeom prst="line">
+            <a:avLst/>
+          </a:prstGeom>
+          <a:ln>
+            <a:solidFill>
+              <a:schemeClr val="tx1"/>
+            </a:solidFill>
+          </a:ln>
+          <a:effectLst/>
+        </p:spPr>
+        <p:style>
+          <a:lnRef idx="2">
+            <a:schemeClr val="accent1"/>
+          </a:lnRef>
+          <a:fillRef idx="0">
+            <a:schemeClr val="accent1"/>
+          </a:fillRef>
+          <a:effectRef idx="1">
+            <a:schemeClr val="accent1"/>
+          </a:effectRef>
+          <a:fontRef idx="minor">
+            <a:schemeClr val="tx1"/>
+          </a:fontRef>
+        </p:style>
+      </p:cxnSp>
+      <p:sp>
+        <p:nvSpPr>
+          <p:cNvPr id="23" name="TextBox 22"/>
+          <p:cNvSpPr txBox="1"/>
+          <p:nvPr/>
+        </p:nvSpPr>
+        <p:spPr>
+          <a:xfrm>
+            <a:off x="3780375" y="2931299"/>
+            <a:ext cx="650163" cy="307777"/>
+          </a:xfrm>
+          <a:prstGeom prst="rect">
+            <a:avLst/>
+          </a:prstGeom>
+          <a:solidFill>
+            <a:schemeClr val="bg1"/>
+          </a:solidFill>
+          <a:effectLst/>
+        </p:spPr>
+        <p:txBody>
+          <a:bodyPr wrap="none" rtlCol="0">
+            <a:spAutoFit/>
+          </a:bodyPr>
+          <a:lstStyle/>
+          <a:p>
+            <a:r>
+              <a:rPr lang="pl-PL" sz="1400" noProof="1" smtClean="0"/>
+              <a:t>Inserir</a:t>
+            </a:r>
+            <a:endParaRPr lang="pl-PL" sz="1400" noProof="1"/>
+          </a:p>
+        </p:txBody>
+      </p:sp>
+      <p:sp>
+        <p:nvSpPr>
+          <p:cNvPr id="42" name="TextBox 41"/>
+          <p:cNvSpPr txBox="1"/>
+          <p:nvPr/>
+        </p:nvSpPr>
+        <p:spPr>
+          <a:xfrm>
+            <a:off x="3221588" y="1047465"/>
+            <a:ext cx="787395" cy="307777"/>
+          </a:xfrm>
+          <a:prstGeom prst="rect">
+            <a:avLst/>
+          </a:prstGeom>
+          <a:solidFill>
+            <a:schemeClr val="bg1"/>
+          </a:solidFill>
+          <a:effectLst/>
+        </p:spPr>
+        <p:txBody>
+          <a:bodyPr wrap="none" rtlCol="0">
+            <a:spAutoFit/>
+          </a:bodyPr>
+          <a:lstStyle/>
+          <a:p>
+            <a:r>
+              <a:rPr lang="pl-PL" sz="1400" noProof="1" smtClean="0"/>
+              <a:t>Iterador</a:t>
+            </a:r>
+            <a:endParaRPr lang="pl-PL" sz="1400" noProof="1"/>
+          </a:p>
+        </p:txBody>
+      </p:sp>
+      <p:cxnSp>
+        <p:nvCxnSpPr>
+          <p:cNvPr id="43" name="Straight Arrow Connector 42"/>
+          <p:cNvCxnSpPr>
+            <a:endCxn id="6" idx="0"/>
+          </p:cNvCxnSpPr>
+          <p:nvPr/>
+        </p:nvCxnSpPr>
+        <p:spPr>
+          <a:xfrm>
+            <a:off x="3975113" y="1263366"/>
+            <a:ext cx="431793" cy="677333"/>
+          </a:xfrm>
+          <a:prstGeom prst="straightConnector1">
+            <a:avLst/>
+          </a:prstGeom>
+          <a:ln>
+            <a:solidFill>
+              <a:schemeClr val="tx1"/>
+            </a:solidFill>
+            <a:prstDash val="solid"/>
+            <a:tailEnd type="arrow"/>
+          </a:ln>
+          <a:effectLst/>
+        </p:spPr>
+        <p:style>
+          <a:lnRef idx="2">
+            <a:schemeClr val="accent1"/>
+          </a:lnRef>
+          <a:fillRef idx="0">
+            <a:schemeClr val="accent1"/>
+          </a:fillRef>
+          <a:effectRef idx="1">
+            <a:schemeClr val="accent1"/>
+          </a:effectRef>
+          <a:fontRef idx="minor">
+            <a:schemeClr val="tx1"/>
+          </a:fontRef>
+        </p:style>
+      </p:cxnSp>
+      <p:sp>
+        <p:nvSpPr>
+          <p:cNvPr id="45" name="Rectangle 44"/>
+          <p:cNvSpPr/>
+          <p:nvPr/>
+        </p:nvSpPr>
+        <p:spPr>
+          <a:xfrm>
+            <a:off x="3289305" y="4442599"/>
+            <a:ext cx="364065" cy="321733"/>
+          </a:xfrm>
+          <a:prstGeom prst="rect">
+            <a:avLst/>
+          </a:prstGeom>
+          <a:ln>
+            <a:solidFill>
+              <a:schemeClr val="tx1"/>
+            </a:solidFill>
+          </a:ln>
+          <a:effectLst/>
+        </p:spPr>
+        <p:style>
+          <a:lnRef idx="2">
+            <a:schemeClr val="accent1"/>
+          </a:lnRef>
+          <a:fillRef idx="1">
+            <a:schemeClr val="lt1"/>
+          </a:fillRef>
+          <a:effectRef idx="0">
+            <a:schemeClr val="accent1"/>
+          </a:effectRef>
+          <a:fontRef idx="minor">
+            <a:schemeClr val="dk1"/>
+          </a:fontRef>
+        </p:style>
+        <p:txBody>
+          <a:bodyPr rtlCol="0" anchor="ctr"/>
+          <a:lstStyle/>
+          <a:p>
+            <a:pPr algn="ctr"/>
+            <a:r>
+              <a:rPr lang="pl-PL" sz="1400" noProof="1" smtClean="0"/>
+              <a:t>15</a:t>
+            </a:r>
+            <a:endParaRPr lang="pl-PL" sz="1400" noProof="1"/>
+          </a:p>
+        </p:txBody>
+      </p:sp>
+      <p:sp>
+        <p:nvSpPr>
+          <p:cNvPr id="46" name="Rectangle 45"/>
+          <p:cNvSpPr/>
+          <p:nvPr/>
+        </p:nvSpPr>
+        <p:spPr>
+          <a:xfrm>
+            <a:off x="3653370" y="4442599"/>
+            <a:ext cx="364065" cy="321733"/>
+          </a:xfrm>
+          <a:prstGeom prst="rect">
+            <a:avLst/>
+          </a:prstGeom>
+          <a:ln>
+            <a:solidFill>
+              <a:schemeClr val="tx1"/>
+            </a:solidFill>
+          </a:ln>
+          <a:effectLst/>
+        </p:spPr>
+        <p:style>
+          <a:lnRef idx="2">
+            <a:schemeClr val="accent1"/>
+          </a:lnRef>
+          <a:fillRef idx="1">
+            <a:schemeClr val="lt1"/>
+          </a:fillRef>
+          <a:effectRef idx="0">
+            <a:schemeClr val="accent1"/>
+          </a:effectRef>
+          <a:fontRef idx="minor">
+            <a:schemeClr val="dk1"/>
+          </a:fontRef>
+        </p:style>
+        <p:txBody>
+          <a:bodyPr rtlCol="0" anchor="ctr"/>
+          <a:lstStyle/>
+          <a:p>
+            <a:pPr algn="ctr"/>
+            <a:endParaRPr lang="pl-PL" sz="1400" noProof="1"/>
+          </a:p>
+        </p:txBody>
+      </p:sp>
+      <p:sp>
+        <p:nvSpPr>
+          <p:cNvPr id="47" name="Rectangle 46"/>
+          <p:cNvSpPr/>
+          <p:nvPr/>
+        </p:nvSpPr>
+        <p:spPr>
+          <a:xfrm>
+            <a:off x="4373038" y="4442599"/>
+            <a:ext cx="364065" cy="321733"/>
+          </a:xfrm>
+          <a:prstGeom prst="rect">
+            <a:avLst/>
+          </a:prstGeom>
+          <a:ln>
+            <a:solidFill>
+              <a:schemeClr val="tx1"/>
+            </a:solidFill>
+          </a:ln>
+          <a:effectLst/>
+        </p:spPr>
+        <p:style>
+          <a:lnRef idx="2">
+            <a:schemeClr val="accent1"/>
+          </a:lnRef>
+          <a:fillRef idx="1">
+            <a:schemeClr val="lt1"/>
+          </a:fillRef>
+          <a:effectRef idx="0">
+            <a:schemeClr val="accent1"/>
+          </a:effectRef>
+          <a:fontRef idx="minor">
+            <a:schemeClr val="dk1"/>
+          </a:fontRef>
+        </p:style>
+        <p:txBody>
+          <a:bodyPr rtlCol="0" anchor="ctr"/>
+          <a:lstStyle/>
+          <a:p>
+            <a:pPr algn="ctr"/>
+            <a:r>
+              <a:rPr lang="pl-PL" sz="1400" noProof="1" smtClean="0"/>
+              <a:t>30</a:t>
+            </a:r>
+            <a:endParaRPr lang="pl-PL" sz="1400" noProof="1"/>
+          </a:p>
+        </p:txBody>
+      </p:sp>
+      <p:sp>
+        <p:nvSpPr>
+          <p:cNvPr id="48" name="Rectangle 47"/>
+          <p:cNvSpPr/>
+          <p:nvPr/>
+        </p:nvSpPr>
+        <p:spPr>
+          <a:xfrm>
+            <a:off x="4737103" y="4442599"/>
+            <a:ext cx="364065" cy="321733"/>
+          </a:xfrm>
+          <a:prstGeom prst="rect">
+            <a:avLst/>
+          </a:prstGeom>
+          <a:ln>
+            <a:solidFill>
+              <a:schemeClr val="tx1"/>
+            </a:solidFill>
+          </a:ln>
+          <a:effectLst/>
+        </p:spPr>
+        <p:style>
+          <a:lnRef idx="2">
+            <a:schemeClr val="accent1"/>
+          </a:lnRef>
+          <a:fillRef idx="1">
+            <a:schemeClr val="lt1"/>
+          </a:fillRef>
+          <a:effectRef idx="0">
+            <a:schemeClr val="accent1"/>
+          </a:effectRef>
+          <a:fontRef idx="minor">
+            <a:schemeClr val="dk1"/>
+          </a:fontRef>
+        </p:style>
+        <p:txBody>
+          <a:bodyPr rtlCol="0" anchor="ctr"/>
+          <a:lstStyle/>
+          <a:p>
+            <a:pPr algn="ctr"/>
+            <a:endParaRPr lang="pl-PL" sz="1400" noProof="1"/>
+          </a:p>
+        </p:txBody>
+      </p:sp>
+      <p:sp>
+        <p:nvSpPr>
+          <p:cNvPr id="49" name="Rectangle 48"/>
+          <p:cNvSpPr/>
+          <p:nvPr/>
+        </p:nvSpPr>
+        <p:spPr>
+          <a:xfrm>
+            <a:off x="6371174" y="4448664"/>
+            <a:ext cx="364065" cy="321733"/>
+          </a:xfrm>
+          <a:prstGeom prst="rect">
+            <a:avLst/>
+          </a:prstGeom>
+          <a:ln>
+            <a:solidFill>
+              <a:schemeClr val="tx1"/>
+            </a:solidFill>
+          </a:ln>
+          <a:effectLst/>
+        </p:spPr>
+        <p:style>
+          <a:lnRef idx="2">
+            <a:schemeClr val="accent1"/>
+          </a:lnRef>
+          <a:fillRef idx="1">
+            <a:schemeClr val="lt1"/>
+          </a:fillRef>
+          <a:effectRef idx="0">
+            <a:schemeClr val="accent1"/>
+          </a:effectRef>
+          <a:fontRef idx="minor">
+            <a:schemeClr val="dk1"/>
+          </a:fontRef>
+        </p:style>
+        <p:txBody>
+          <a:bodyPr rtlCol="0" anchor="ctr"/>
+          <a:lstStyle/>
+          <a:p>
+            <a:pPr algn="ctr"/>
+            <a:r>
+              <a:rPr lang="pl-PL" sz="1400" noProof="1" smtClean="0"/>
+              <a:t>6</a:t>
+            </a:r>
+            <a:endParaRPr lang="pl-PL" sz="1400" noProof="1"/>
+          </a:p>
+        </p:txBody>
+      </p:sp>
+      <p:sp>
+        <p:nvSpPr>
+          <p:cNvPr id="50" name="Rectangle 49"/>
+          <p:cNvSpPr/>
+          <p:nvPr/>
+        </p:nvSpPr>
+        <p:spPr>
+          <a:xfrm>
+            <a:off x="6735239" y="4448664"/>
+            <a:ext cx="364065" cy="321733"/>
+          </a:xfrm>
+          <a:prstGeom prst="rect">
+            <a:avLst/>
+          </a:prstGeom>
+          <a:ln>
+            <a:solidFill>
+              <a:schemeClr val="tx1"/>
+            </a:solidFill>
+          </a:ln>
+          <a:effectLst/>
+        </p:spPr>
+        <p:style>
+          <a:lnRef idx="2">
+            <a:schemeClr val="accent1"/>
+          </a:lnRef>
+          <a:fillRef idx="1">
+            <a:schemeClr val="lt1"/>
+          </a:fillRef>
+          <a:effectRef idx="0">
+            <a:schemeClr val="accent1"/>
+          </a:effectRef>
+          <a:fontRef idx="minor">
+            <a:schemeClr val="dk1"/>
+          </a:fontRef>
+        </p:style>
+        <p:txBody>
+          <a:bodyPr rtlCol="0" anchor="ctr"/>
+          <a:lstStyle/>
+          <a:p>
+            <a:pPr algn="ctr"/>
+            <a:endParaRPr lang="pl-PL" sz="1400" noProof="1"/>
+          </a:p>
+        </p:txBody>
+      </p:sp>
+      <p:sp>
+        <p:nvSpPr>
+          <p:cNvPr id="51" name="Rectangle 50"/>
+          <p:cNvSpPr/>
+          <p:nvPr/>
+        </p:nvSpPr>
+        <p:spPr>
+          <a:xfrm>
+            <a:off x="7476076" y="4448664"/>
+            <a:ext cx="364065" cy="321733"/>
+          </a:xfrm>
+          <a:prstGeom prst="rect">
+            <a:avLst/>
+          </a:prstGeom>
+          <a:ln>
+            <a:solidFill>
+              <a:schemeClr val="tx1"/>
+            </a:solidFill>
+          </a:ln>
+          <a:effectLst/>
+        </p:spPr>
+        <p:style>
+          <a:lnRef idx="2">
+            <a:schemeClr val="accent1"/>
+          </a:lnRef>
+          <a:fillRef idx="1">
+            <a:schemeClr val="lt1"/>
+          </a:fillRef>
+          <a:effectRef idx="0">
+            <a:schemeClr val="accent1"/>
+          </a:effectRef>
+          <a:fontRef idx="minor">
+            <a:schemeClr val="dk1"/>
+          </a:fontRef>
+        </p:style>
+        <p:txBody>
+          <a:bodyPr rtlCol="0" anchor="ctr"/>
+          <a:lstStyle/>
+          <a:p>
+            <a:pPr algn="ctr"/>
+            <a:r>
+              <a:rPr lang="pl-PL" sz="1400" noProof="1" smtClean="0"/>
+              <a:t>4</a:t>
+            </a:r>
+            <a:endParaRPr lang="pl-PL" sz="1400" noProof="1"/>
+          </a:p>
+        </p:txBody>
+      </p:sp>
+      <p:sp>
+        <p:nvSpPr>
+          <p:cNvPr id="52" name="Rectangle 51"/>
+          <p:cNvSpPr/>
+          <p:nvPr/>
+        </p:nvSpPr>
+        <p:spPr>
+          <a:xfrm>
+            <a:off x="7840141" y="4448664"/>
+            <a:ext cx="364065" cy="321733"/>
+          </a:xfrm>
+          <a:prstGeom prst="rect">
+            <a:avLst/>
+          </a:prstGeom>
+          <a:ln>
+            <a:solidFill>
+              <a:schemeClr val="tx1"/>
+            </a:solidFill>
+          </a:ln>
+          <a:effectLst/>
+        </p:spPr>
+        <p:style>
+          <a:lnRef idx="2">
+            <a:schemeClr val="accent1"/>
+          </a:lnRef>
+          <a:fillRef idx="1">
+            <a:schemeClr val="lt1"/>
+          </a:fillRef>
+          <a:effectRef idx="0">
+            <a:schemeClr val="accent1"/>
+          </a:effectRef>
+          <a:fontRef idx="minor">
+            <a:schemeClr val="dk1"/>
+          </a:fontRef>
+        </p:style>
+        <p:txBody>
+          <a:bodyPr rtlCol="0" anchor="ctr"/>
+          <a:lstStyle/>
+          <a:p>
+            <a:pPr algn="ctr"/>
+            <a:endParaRPr lang="pl-PL" sz="1400" noProof="1"/>
+          </a:p>
+        </p:txBody>
+      </p:sp>
+      <p:cxnSp>
+        <p:nvCxnSpPr>
+          <p:cNvPr id="53" name="Straight Connector 52"/>
+          <p:cNvCxnSpPr/>
+          <p:nvPr/>
+        </p:nvCxnSpPr>
+        <p:spPr>
+          <a:xfrm flipH="1">
+            <a:off x="7840141" y="4448664"/>
+            <a:ext cx="364065" cy="321733"/>
+          </a:xfrm>
+          <a:prstGeom prst="line">
+            <a:avLst/>
+          </a:prstGeom>
+          <a:ln>
+            <a:solidFill>
+              <a:schemeClr val="tx1"/>
+            </a:solidFill>
+          </a:ln>
+          <a:effectLst/>
+        </p:spPr>
+        <p:style>
+          <a:lnRef idx="2">
+            <a:schemeClr val="accent1"/>
+          </a:lnRef>
+          <a:fillRef idx="0">
+            <a:schemeClr val="accent1"/>
+          </a:fillRef>
+          <a:effectRef idx="1">
+            <a:schemeClr val="accent1"/>
+          </a:effectRef>
+          <a:fontRef idx="minor">
+            <a:schemeClr val="tx1"/>
+          </a:fontRef>
+        </p:style>
+      </p:cxnSp>
+      <p:cxnSp>
+        <p:nvCxnSpPr>
+          <p:cNvPr id="54" name="Straight Connector 53"/>
+          <p:cNvCxnSpPr/>
+          <p:nvPr/>
+        </p:nvCxnSpPr>
+        <p:spPr>
+          <a:xfrm>
+            <a:off x="7840141" y="4448664"/>
+            <a:ext cx="364065" cy="321733"/>
+          </a:xfrm>
+          <a:prstGeom prst="line">
+            <a:avLst/>
+          </a:prstGeom>
+          <a:ln>
+            <a:solidFill>
+              <a:schemeClr val="tx1"/>
+            </a:solidFill>
+          </a:ln>
+          <a:effectLst/>
+        </p:spPr>
+        <p:style>
+          <a:lnRef idx="2">
+            <a:schemeClr val="accent1"/>
+          </a:lnRef>
+          <a:fillRef idx="0">
+            <a:schemeClr val="accent1"/>
+          </a:fillRef>
+          <a:effectRef idx="1">
+            <a:schemeClr val="accent1"/>
+          </a:effectRef>
+          <a:fontRef idx="minor">
+            <a:schemeClr val="tx1"/>
+          </a:fontRef>
+        </p:style>
+      </p:cxnSp>
+      <p:cxnSp>
+        <p:nvCxnSpPr>
+          <p:cNvPr id="55" name="Straight Arrow Connector 54"/>
+          <p:cNvCxnSpPr>
+            <a:endCxn id="47" idx="1"/>
+          </p:cNvCxnSpPr>
+          <p:nvPr/>
+        </p:nvCxnSpPr>
+        <p:spPr>
+          <a:xfrm>
+            <a:off x="3826935" y="4603466"/>
+            <a:ext cx="546103" cy="0"/>
+          </a:xfrm>
+          <a:prstGeom prst="straightConnector1">
+            <a:avLst/>
+          </a:prstGeom>
+          <a:ln>
+            <a:solidFill>
+              <a:schemeClr val="tx1"/>
+            </a:solidFill>
+            <a:tailEnd type="arrow"/>
+          </a:ln>
+          <a:effectLst/>
+        </p:spPr>
+        <p:style>
+          <a:lnRef idx="2">
+            <a:schemeClr val="accent1"/>
+          </a:lnRef>
+          <a:fillRef idx="0">
+            <a:schemeClr val="accent1"/>
+          </a:fillRef>
+          <a:effectRef idx="1">
+            <a:schemeClr val="accent1"/>
+          </a:effectRef>
+          <a:fontRef idx="minor">
+            <a:schemeClr val="tx1"/>
+          </a:fontRef>
+        </p:style>
+      </p:cxnSp>
+      <p:cxnSp>
+        <p:nvCxnSpPr>
+          <p:cNvPr id="56" name="Straight Arrow Connector 55"/>
+          <p:cNvCxnSpPr>
+            <a:endCxn id="62" idx="1"/>
+          </p:cNvCxnSpPr>
+          <p:nvPr/>
+        </p:nvCxnSpPr>
+        <p:spPr>
+          <a:xfrm>
+            <a:off x="4902202" y="4603466"/>
+            <a:ext cx="537635" cy="850900"/>
+          </a:xfrm>
+          <a:prstGeom prst="straightConnector1">
+            <a:avLst/>
+          </a:prstGeom>
+          <a:ln>
+            <a:solidFill>
+              <a:schemeClr val="tx1"/>
+            </a:solidFill>
+            <a:tailEnd type="arrow"/>
+          </a:ln>
+          <a:effectLst/>
+        </p:spPr>
+        <p:style>
+          <a:lnRef idx="2">
+            <a:schemeClr val="accent1"/>
+          </a:lnRef>
+          <a:fillRef idx="0">
+            <a:schemeClr val="accent1"/>
+          </a:fillRef>
+          <a:effectRef idx="1">
+            <a:schemeClr val="accent1"/>
+          </a:effectRef>
+          <a:fontRef idx="minor">
+            <a:schemeClr val="tx1"/>
+          </a:fontRef>
+        </p:style>
+      </p:cxnSp>
+      <p:cxnSp>
+        <p:nvCxnSpPr>
+          <p:cNvPr id="57" name="Straight Arrow Connector 56"/>
+          <p:cNvCxnSpPr/>
+          <p:nvPr/>
+        </p:nvCxnSpPr>
+        <p:spPr>
+          <a:xfrm>
+            <a:off x="6908804" y="4609531"/>
+            <a:ext cx="546103" cy="0"/>
+          </a:xfrm>
+          <a:prstGeom prst="straightConnector1">
+            <a:avLst/>
+          </a:prstGeom>
+          <a:ln>
+            <a:solidFill>
+              <a:schemeClr val="tx1"/>
+            </a:solidFill>
+            <a:tailEnd type="arrow"/>
+          </a:ln>
+          <a:effectLst/>
+        </p:spPr>
+        <p:style>
+          <a:lnRef idx="2">
+            <a:schemeClr val="accent1"/>
+          </a:lnRef>
+          <a:fillRef idx="0">
+            <a:schemeClr val="accent1"/>
+          </a:fillRef>
+          <a:effectRef idx="1">
+            <a:schemeClr val="accent1"/>
+          </a:effectRef>
+          <a:fontRef idx="minor">
+            <a:schemeClr val="tx1"/>
+          </a:fontRef>
+        </p:style>
+      </p:cxnSp>
+      <p:sp>
+        <p:nvSpPr>
+          <p:cNvPr id="58" name="TextBox 57"/>
+          <p:cNvSpPr txBox="1"/>
+          <p:nvPr/>
+        </p:nvSpPr>
+        <p:spPr>
+          <a:xfrm>
+            <a:off x="1335522" y="4425665"/>
+            <a:ext cx="1353844" cy="307777"/>
+          </a:xfrm>
+          <a:prstGeom prst="rect">
+            <a:avLst/>
+          </a:prstGeom>
+          <a:solidFill>
+            <a:schemeClr val="bg1"/>
+          </a:solidFill>
+          <a:effectLst/>
+        </p:spPr>
+        <p:txBody>
+          <a:bodyPr wrap="none" rtlCol="0">
+            <a:spAutoFit/>
+          </a:bodyPr>
+          <a:lstStyle/>
+          <a:p>
+            <a:r>
+              <a:rPr lang="pl-PL" sz="1400" noProof="1" smtClean="0"/>
+              <a:t>Lista encadeada</a:t>
+            </a:r>
+            <a:endParaRPr lang="pl-PL" sz="1400" noProof="1"/>
+          </a:p>
+        </p:txBody>
+      </p:sp>
+      <p:cxnSp>
+        <p:nvCxnSpPr>
+          <p:cNvPr id="59" name="Straight Arrow Connector 58"/>
+          <p:cNvCxnSpPr>
+            <a:endCxn id="45" idx="1"/>
+          </p:cNvCxnSpPr>
+          <p:nvPr/>
+        </p:nvCxnSpPr>
+        <p:spPr>
+          <a:xfrm>
+            <a:off x="2712628" y="4603466"/>
+            <a:ext cx="576677" cy="0"/>
+          </a:xfrm>
+          <a:prstGeom prst="straightConnector1">
+            <a:avLst/>
+          </a:prstGeom>
+          <a:ln>
+            <a:solidFill>
+              <a:schemeClr val="tx1"/>
+            </a:solidFill>
+            <a:prstDash val="solid"/>
+            <a:tailEnd type="arrow"/>
+          </a:ln>
+          <a:effectLst/>
+        </p:spPr>
+        <p:style>
+          <a:lnRef idx="2">
+            <a:schemeClr val="accent1"/>
+          </a:lnRef>
+          <a:fillRef idx="0">
+            <a:schemeClr val="accent1"/>
+          </a:fillRef>
+          <a:effectRef idx="1">
+            <a:schemeClr val="accent1"/>
+          </a:effectRef>
+          <a:fontRef idx="minor">
+            <a:schemeClr val="tx1"/>
+          </a:fontRef>
+        </p:style>
+      </p:cxnSp>
+      <p:sp>
+        <p:nvSpPr>
+          <p:cNvPr id="60" name="TextBox 59"/>
+          <p:cNvSpPr txBox="1"/>
+          <p:nvPr/>
+        </p:nvSpPr>
+        <p:spPr>
+          <a:xfrm>
+            <a:off x="3369753" y="3549365"/>
+            <a:ext cx="787395" cy="307777"/>
+          </a:xfrm>
+          <a:prstGeom prst="rect">
+            <a:avLst/>
+          </a:prstGeom>
+          <a:solidFill>
+            <a:schemeClr val="bg1"/>
+          </a:solidFill>
+          <a:effectLst/>
+        </p:spPr>
+        <p:txBody>
+          <a:bodyPr wrap="none" rtlCol="0">
+            <a:spAutoFit/>
+          </a:bodyPr>
+          <a:lstStyle/>
+          <a:p>
+            <a:r>
+              <a:rPr lang="pl-PL" sz="1400" noProof="1" smtClean="0"/>
+              <a:t>Iterador</a:t>
+            </a:r>
+            <a:endParaRPr lang="pl-PL" sz="1400" noProof="1"/>
+          </a:p>
+        </p:txBody>
+      </p:sp>
+      <p:cxnSp>
+        <p:nvCxnSpPr>
+          <p:cNvPr id="61" name="Straight Arrow Connector 60"/>
+          <p:cNvCxnSpPr>
+            <a:endCxn id="47" idx="0"/>
+          </p:cNvCxnSpPr>
+          <p:nvPr/>
+        </p:nvCxnSpPr>
+        <p:spPr>
+          <a:xfrm>
+            <a:off x="4123278" y="3765266"/>
+            <a:ext cx="431793" cy="677333"/>
+          </a:xfrm>
+          <a:prstGeom prst="straightConnector1">
+            <a:avLst/>
+          </a:prstGeom>
+          <a:ln>
+            <a:solidFill>
+              <a:schemeClr val="tx1"/>
+            </a:solidFill>
+            <a:prstDash val="solid"/>
+            <a:tailEnd type="arrow"/>
+          </a:ln>
+          <a:effectLst/>
+        </p:spPr>
+        <p:style>
+          <a:lnRef idx="2">
+            <a:schemeClr val="accent1"/>
+          </a:lnRef>
+          <a:fillRef idx="0">
+            <a:schemeClr val="accent1"/>
+          </a:fillRef>
+          <a:effectRef idx="1">
+            <a:schemeClr val="accent1"/>
+          </a:effectRef>
+          <a:fontRef idx="minor">
+            <a:schemeClr val="tx1"/>
+          </a:fontRef>
+        </p:style>
+      </p:cxnSp>
+      <p:sp>
+        <p:nvSpPr>
+          <p:cNvPr id="62" name="Rectangle 61"/>
+          <p:cNvSpPr/>
+          <p:nvPr/>
+        </p:nvSpPr>
+        <p:spPr>
+          <a:xfrm>
+            <a:off x="5439837" y="5293499"/>
+            <a:ext cx="364065" cy="321733"/>
+          </a:xfrm>
+          <a:prstGeom prst="rect">
+            <a:avLst/>
+          </a:prstGeom>
+          <a:ln>
+            <a:solidFill>
+              <a:schemeClr val="tx1"/>
+            </a:solidFill>
+          </a:ln>
+          <a:effectLst/>
+        </p:spPr>
+        <p:style>
+          <a:lnRef idx="2">
+            <a:schemeClr val="accent1"/>
+          </a:lnRef>
+          <a:fillRef idx="1">
+            <a:schemeClr val="lt1"/>
+          </a:fillRef>
+          <a:effectRef idx="0">
+            <a:schemeClr val="accent1"/>
+          </a:effectRef>
+          <a:fontRef idx="minor">
+            <a:schemeClr val="dk1"/>
+          </a:fontRef>
+        </p:style>
+        <p:txBody>
+          <a:bodyPr rtlCol="0" anchor="ctr"/>
+          <a:lstStyle/>
+          <a:p>
+            <a:pPr algn="ctr"/>
+            <a:r>
+              <a:rPr lang="pl-PL" sz="1400" noProof="1" smtClean="0"/>
+              <a:t>7</a:t>
+            </a:r>
+            <a:endParaRPr lang="pl-PL" sz="1400" noProof="1"/>
+          </a:p>
+        </p:txBody>
+      </p:sp>
+      <p:sp>
+        <p:nvSpPr>
+          <p:cNvPr id="63" name="Rectangle 62"/>
+          <p:cNvSpPr/>
+          <p:nvPr/>
+        </p:nvSpPr>
+        <p:spPr>
+          <a:xfrm>
+            <a:off x="5803902" y="5293499"/>
+            <a:ext cx="364065" cy="321733"/>
+          </a:xfrm>
+          <a:prstGeom prst="rect">
+            <a:avLst/>
+          </a:prstGeom>
+          <a:ln>
+            <a:solidFill>
+              <a:schemeClr val="tx1"/>
+            </a:solidFill>
+          </a:ln>
+          <a:effectLst/>
+        </p:spPr>
+        <p:style>
+          <a:lnRef idx="2">
+            <a:schemeClr val="accent1"/>
+          </a:lnRef>
+          <a:fillRef idx="1">
+            <a:schemeClr val="lt1"/>
+          </a:fillRef>
+          <a:effectRef idx="0">
+            <a:schemeClr val="accent1"/>
+          </a:effectRef>
+          <a:fontRef idx="minor">
+            <a:schemeClr val="dk1"/>
+          </a:fontRef>
+        </p:style>
+        <p:txBody>
+          <a:bodyPr rtlCol="0" anchor="ctr"/>
+          <a:lstStyle/>
+          <a:p>
+            <a:pPr algn="ctr"/>
+            <a:endParaRPr lang="pl-PL" sz="1400" noProof="1"/>
+          </a:p>
+        </p:txBody>
+      </p:sp>
+      <p:cxnSp>
+        <p:nvCxnSpPr>
+          <p:cNvPr id="69" name="Straight Arrow Connector 68"/>
+          <p:cNvCxnSpPr>
+            <a:endCxn id="49" idx="1"/>
+          </p:cNvCxnSpPr>
+          <p:nvPr/>
+        </p:nvCxnSpPr>
+        <p:spPr>
+          <a:xfrm flipV="1">
+            <a:off x="5926671" y="4609531"/>
+            <a:ext cx="444503" cy="844835"/>
+          </a:xfrm>
+          <a:prstGeom prst="straightConnector1">
+            <a:avLst/>
+          </a:prstGeom>
+          <a:ln>
+            <a:solidFill>
+              <a:schemeClr val="tx1"/>
+            </a:solidFill>
+            <a:tailEnd type="arrow"/>
+          </a:ln>
+          <a:effectLst/>
+        </p:spPr>
+        <p:style>
+          <a:lnRef idx="2">
+            <a:schemeClr val="accent1"/>
+          </a:lnRef>
+          <a:fillRef idx="0">
+            <a:schemeClr val="accent1"/>
+          </a:fillRef>
+          <a:effectRef idx="1">
+            <a:schemeClr val="accent1"/>
+          </a:effectRef>
+          <a:fontRef idx="minor">
+            <a:schemeClr val="tx1"/>
+          </a:fontRef>
+        </p:style>
+      </p:cxnSp>
+    </p:spTree>
+    <p:extLst>
+      <p:ext uri="{BB962C8B-B14F-4D97-AF65-F5344CB8AC3E}">
+        <p14:creationId xmlns:p14="http://schemas.microsoft.com/office/powerpoint/2010/main" val="193327290"/>
       </p:ext>
     </p:extLst>
   </p:cSld>

</xml_diff>